<commit_message>
Breaking presentation into 2 parts
</commit_message>
<xml_diff>
--- a/unit_03/slides/01 Intro to MongoDB.pptx
+++ b/unit_03/slides/01 Intro to MongoDB.pptx
@@ -37,19 +37,8 @@
     <p:sldId id="302" r:id="rId34"/>
     <p:sldId id="280" r:id="rId35"/>
     <p:sldId id="281" r:id="rId36"/>
-    <p:sldId id="288" r:id="rId37"/>
-    <p:sldId id="268" r:id="rId38"/>
-    <p:sldId id="291" r:id="rId39"/>
-    <p:sldId id="294" r:id="rId40"/>
-    <p:sldId id="292" r:id="rId41"/>
-    <p:sldId id="293" r:id="rId42"/>
-    <p:sldId id="295" r:id="rId43"/>
-    <p:sldId id="296" r:id="rId44"/>
-    <p:sldId id="297" r:id="rId45"/>
-    <p:sldId id="298" r:id="rId46"/>
-    <p:sldId id="299" r:id="rId47"/>
-    <p:sldId id="290" r:id="rId48"/>
-    <p:sldId id="289" r:id="rId49"/>
+    <p:sldId id="290" r:id="rId37"/>
+    <p:sldId id="289" r:id="rId38"/>
   </p:sldIdLst>
   <p:sldSz cx="12192000" cy="6858000"/>
   <p:notesSz cx="6858000" cy="9144000"/>
@@ -4218,13 +4207,18 @@
           <a:lstStyle/>
           <a:p>
             <a:r>
-              <a:rPr lang="en-US" sz="4400" dirty="0">
+              <a:rPr lang="en-US" sz="4400" cap="none">
                 <a:solidFill>
                   <a:schemeClr val="tx1"/>
                 </a:solidFill>
               </a:rPr>
               <a:t>Intro to MongoDB</a:t>
             </a:r>
+            <a:endParaRPr lang="en-US" sz="4400" cap="none" dirty="0">
+              <a:solidFill>
+                <a:schemeClr val="tx1"/>
+              </a:solidFill>
+            </a:endParaRPr>
           </a:p>
         </p:txBody>
       </p:sp>
@@ -5018,7 +5012,7 @@
                   <a:schemeClr val="tx1"/>
                 </a:solidFill>
               </a:rPr>
-              <a:t>Installing MongoDB</a:t>
+              <a:t>MongoDB Software</a:t>
             </a:r>
           </a:p>
         </p:txBody>
@@ -12958,2291 +12952,6 @@
       </p:grpSpPr>
       <p:sp>
         <p:nvSpPr>
-          <p:cNvPr id="10" name="Rectangle 9">
-            <a:extLst>
-              <a:ext uri="{FF2B5EF4-FFF2-40B4-BE49-F238E27FC236}">
-                <a16:creationId xmlns:a16="http://schemas.microsoft.com/office/drawing/2014/main" id="{904DB13E-F722-4ED6-BB00-556651E95281}"/>
-              </a:ext>
-              <a:ext uri="{C183D7F6-B498-43B3-948B-1728B52AA6E4}">
-                <adec:decorative xmlns:adec="http://schemas.microsoft.com/office/drawing/2017/decorative" val="1"/>
-              </a:ext>
-            </a:extLst>
-          </p:cNvPr>
-          <p:cNvSpPr>
-            <a:spLocks noGrp="1" noRot="1" noChangeAspect="1" noMove="1" noResize="1" noEditPoints="1" noAdjustHandles="1" noChangeArrowheads="1" noChangeShapeType="1" noTextEdit="1"/>
-          </p:cNvSpPr>
-          <p:nvPr>
-            <p:extLst>
-              <p:ext uri="{386F3935-93C4-4BCD-93E2-E3B085C9AB24}">
-                <p16:designElem xmlns:p16="http://schemas.microsoft.com/office/powerpoint/2015/main" val="1"/>
-              </p:ext>
-            </p:extLst>
-          </p:nvPr>
-        </p:nvSpPr>
-        <p:spPr>
-          <a:xfrm>
-            <a:off x="0" y="0"/>
-            <a:ext cx="12192000" cy="6858000"/>
-          </a:xfrm>
-          <a:prstGeom prst="rect">
-            <a:avLst/>
-          </a:prstGeom>
-          <a:solidFill>
-            <a:schemeClr val="tx1">
-              <a:lumMod val="65000"/>
-              <a:lumOff val="35000"/>
-            </a:schemeClr>
-          </a:solidFill>
-          <a:ln>
-            <a:noFill/>
-          </a:ln>
-        </p:spPr>
-        <p:style>
-          <a:lnRef idx="2">
-            <a:schemeClr val="accent1">
-              <a:shade val="50000"/>
-            </a:schemeClr>
-          </a:lnRef>
-          <a:fillRef idx="1">
-            <a:schemeClr val="accent1"/>
-          </a:fillRef>
-          <a:effectRef idx="0">
-            <a:schemeClr val="accent1"/>
-          </a:effectRef>
-          <a:fontRef idx="minor">
-            <a:schemeClr val="lt1"/>
-          </a:fontRef>
-        </p:style>
-        <p:txBody>
-          <a:bodyPr rtlCol="0" anchor="ctr"/>
-          <a:lstStyle/>
-          <a:p>
-            <a:pPr algn="ctr"/>
-            <a:endParaRPr lang="en-US"/>
-          </a:p>
-        </p:txBody>
-      </p:sp>
-      <p:sp useBgFill="1">
-        <p:nvSpPr>
-          <p:cNvPr id="12" name="Rectangle 11">
-            <a:extLst>
-              <a:ext uri="{FF2B5EF4-FFF2-40B4-BE49-F238E27FC236}">
-                <a16:creationId xmlns:a16="http://schemas.microsoft.com/office/drawing/2014/main" id="{7B58A187-A4B1-42EB-A4C7-8635BA507BCE}"/>
-              </a:ext>
-              <a:ext uri="{C183D7F6-B498-43B3-948B-1728B52AA6E4}">
-                <adec:decorative xmlns:adec="http://schemas.microsoft.com/office/drawing/2017/decorative" val="1"/>
-              </a:ext>
-            </a:extLst>
-          </p:cNvPr>
-          <p:cNvSpPr>
-            <a:spLocks noGrp="1" noRot="1" noChangeAspect="1" noMove="1" noResize="1" noEditPoints="1" noAdjustHandles="1" noChangeArrowheads="1" noChangeShapeType="1" noTextEdit="1"/>
-          </p:cNvSpPr>
-          <p:nvPr>
-            <p:extLst>
-              <p:ext uri="{386F3935-93C4-4BCD-93E2-E3B085C9AB24}">
-                <p16:designElem xmlns:p16="http://schemas.microsoft.com/office/powerpoint/2015/main" val="1"/>
-              </p:ext>
-            </p:extLst>
-          </p:nvPr>
-        </p:nvSpPr>
-        <p:spPr>
-          <a:xfrm>
-            <a:off x="1307870" y="1267730"/>
-            <a:ext cx="9576262" cy="4307950"/>
-          </a:xfrm>
-          <a:prstGeom prst="rect">
-            <a:avLst/>
-          </a:prstGeom>
-          <a:ln w="6350" cap="flat" cmpd="sng" algn="ctr">
-            <a:noFill/>
-            <a:prstDash val="solid"/>
-          </a:ln>
-          <a:effectLst>
-            <a:outerShdw blurRad="50800" algn="ctr" rotWithShape="0">
-              <a:prstClr val="black">
-                <a:alpha val="66000"/>
-              </a:prstClr>
-            </a:outerShdw>
-            <a:softEdge rad="0"/>
-          </a:effectLst>
-        </p:spPr>
-      </p:sp>
-      <p:sp>
-        <p:nvSpPr>
-          <p:cNvPr id="14" name="Rectangle 13">
-            <a:extLst>
-              <a:ext uri="{FF2B5EF4-FFF2-40B4-BE49-F238E27FC236}">
-                <a16:creationId xmlns:a16="http://schemas.microsoft.com/office/drawing/2014/main" id="{37F14E7F-3054-458C-ACF9-A8DA1757C65C}"/>
-              </a:ext>
-              <a:ext uri="{C183D7F6-B498-43B3-948B-1728B52AA6E4}">
-                <adec:decorative xmlns:adec="http://schemas.microsoft.com/office/drawing/2017/decorative" val="1"/>
-              </a:ext>
-            </a:extLst>
-          </p:cNvPr>
-          <p:cNvSpPr>
-            <a:spLocks noGrp="1" noRot="1" noChangeAspect="1" noMove="1" noResize="1" noEditPoints="1" noAdjustHandles="1" noChangeArrowheads="1" noChangeShapeType="1" noTextEdit="1"/>
-          </p:cNvSpPr>
-          <p:nvPr>
-            <p:extLst>
-              <p:ext uri="{386F3935-93C4-4BCD-93E2-E3B085C9AB24}">
-                <p16:designElem xmlns:p16="http://schemas.microsoft.com/office/powerpoint/2015/main" val="1"/>
-              </p:ext>
-            </p:extLst>
-          </p:nvPr>
-        </p:nvSpPr>
-        <p:spPr>
-          <a:xfrm>
-            <a:off x="1447801" y="1411615"/>
-            <a:ext cx="9296400" cy="4034770"/>
-          </a:xfrm>
-          <a:prstGeom prst="rect">
-            <a:avLst/>
-          </a:prstGeom>
-          <a:noFill/>
-          <a:ln w="6350" cap="sq" cmpd="sng" algn="ctr">
-            <a:solidFill>
-              <a:schemeClr val="tx1">
-                <a:lumMod val="75000"/>
-                <a:lumOff val="25000"/>
-              </a:schemeClr>
-            </a:solidFill>
-            <a:prstDash val="solid"/>
-            <a:miter lim="800000"/>
-          </a:ln>
-          <a:effectLst/>
-        </p:spPr>
-      </p:sp>
-      <p:sp>
-        <p:nvSpPr>
-          <p:cNvPr id="16" name="Rectangle 15">
-            <a:extLst>
-              <a:ext uri="{FF2B5EF4-FFF2-40B4-BE49-F238E27FC236}">
-                <a16:creationId xmlns:a16="http://schemas.microsoft.com/office/drawing/2014/main" id="{93747C1C-97FC-4D70-A6C8-A01FBCF5A9DC}"/>
-              </a:ext>
-              <a:ext uri="{C183D7F6-B498-43B3-948B-1728B52AA6E4}">
-                <adec:decorative xmlns:adec="http://schemas.microsoft.com/office/drawing/2017/decorative" val="1"/>
-              </a:ext>
-            </a:extLst>
-          </p:cNvPr>
-          <p:cNvSpPr>
-            <a:spLocks noGrp="1" noRot="1" noChangeAspect="1" noMove="1" noResize="1" noEditPoints="1" noAdjustHandles="1" noChangeArrowheads="1" noChangeShapeType="1" noTextEdit="1"/>
-          </p:cNvSpPr>
-          <p:nvPr>
-            <p:extLst>
-              <p:ext uri="{386F3935-93C4-4BCD-93E2-E3B085C9AB24}">
-                <p16:designElem xmlns:p16="http://schemas.microsoft.com/office/powerpoint/2015/main" val="1"/>
-              </p:ext>
-            </p:extLst>
-          </p:nvPr>
-        </p:nvSpPr>
-        <p:spPr>
-          <a:xfrm>
-            <a:off x="5135880" y="1267730"/>
-            <a:ext cx="1920240" cy="731520"/>
-          </a:xfrm>
-          <a:prstGeom prst="rect">
-            <a:avLst/>
-          </a:prstGeom>
-          <a:solidFill>
-            <a:schemeClr val="accent1"/>
-          </a:solidFill>
-          <a:ln>
-            <a:noFill/>
-          </a:ln>
-        </p:spPr>
-        <p:style>
-          <a:lnRef idx="2">
-            <a:schemeClr val="accent1">
-              <a:shade val="50000"/>
-            </a:schemeClr>
-          </a:lnRef>
-          <a:fillRef idx="1">
-            <a:schemeClr val="accent1"/>
-          </a:fillRef>
-          <a:effectRef idx="0">
-            <a:schemeClr val="accent1"/>
-          </a:effectRef>
-          <a:fontRef idx="minor">
-            <a:schemeClr val="lt1"/>
-          </a:fontRef>
-        </p:style>
-      </p:sp>
-      <p:grpSp>
-        <p:nvGrpSpPr>
-          <p:cNvPr id="18" name="Group 17">
-            <a:extLst>
-              <a:ext uri="{FF2B5EF4-FFF2-40B4-BE49-F238E27FC236}">
-                <a16:creationId xmlns:a16="http://schemas.microsoft.com/office/drawing/2014/main" id="{E26428D7-C6F3-473D-A360-A3F5C3E8728C}"/>
-              </a:ext>
-              <a:ext uri="{C183D7F6-B498-43B3-948B-1728B52AA6E4}">
-                <adec:decorative xmlns:adec="http://schemas.microsoft.com/office/drawing/2017/decorative" val="1"/>
-              </a:ext>
-            </a:extLst>
-          </p:cNvPr>
-          <p:cNvGrpSpPr>
-            <a:grpSpLocks noGrp="1" noUngrp="1" noRot="1" noChangeAspect="1" noMove="1" noResize="1"/>
-          </p:cNvGrpSpPr>
-          <p:nvPr>
-            <p:extLst>
-              <p:ext uri="{386F3935-93C4-4BCD-93E2-E3B085C9AB24}">
-                <p16:designElem xmlns:p16="http://schemas.microsoft.com/office/powerpoint/2015/main" val="1"/>
-              </p:ext>
-            </p:extLst>
-          </p:nvPr>
-        </p:nvGrpSpPr>
-        <p:grpSpPr>
-          <a:xfrm>
-            <a:off x="5250180" y="1267730"/>
-            <a:ext cx="1691640" cy="615934"/>
-            <a:chOff x="5250180" y="1267730"/>
-            <a:chExt cx="1691640" cy="615934"/>
-          </a:xfrm>
-        </p:grpSpPr>
-        <p:cxnSp>
-          <p:nvCxnSpPr>
-            <p:cNvPr id="19" name="Straight Connector 18">
-              <a:extLst>
-                <a:ext uri="{FF2B5EF4-FFF2-40B4-BE49-F238E27FC236}">
-                  <a16:creationId xmlns:a16="http://schemas.microsoft.com/office/drawing/2014/main" id="{05CDC370-AE44-4300-98BA-FE204E881765}"/>
-                </a:ext>
-                <a:ext uri="{C183D7F6-B498-43B3-948B-1728B52AA6E4}">
-                  <adec:decorative xmlns:adec="http://schemas.microsoft.com/office/drawing/2017/decorative" val="1"/>
-                </a:ext>
-              </a:extLst>
-            </p:cNvPr>
-            <p:cNvCxnSpPr/>
-            <p:nvPr>
-              <p:extLst>
-                <p:ext uri="{386F3935-93C4-4BCD-93E2-E3B085C9AB24}">
-                  <p16:designElem xmlns:p16="http://schemas.microsoft.com/office/powerpoint/2015/main" val="1"/>
-                </p:ext>
-              </p:extLst>
-            </p:nvPr>
-          </p:nvCxnSpPr>
-          <p:spPr>
-            <a:xfrm>
-              <a:off x="5250180" y="1267730"/>
-              <a:ext cx="0" cy="612648"/>
-            </a:xfrm>
-            <a:prstGeom prst="line">
-              <a:avLst/>
-            </a:prstGeom>
-            <a:solidFill>
-              <a:schemeClr val="tx1">
-                <a:lumMod val="85000"/>
-                <a:lumOff val="15000"/>
-              </a:schemeClr>
-            </a:solidFill>
-            <a:ln>
-              <a:solidFill>
-                <a:srgbClr val="FFFFFF"/>
-              </a:solidFill>
-              <a:miter lim="800000"/>
-            </a:ln>
-          </p:spPr>
-          <p:style>
-            <a:lnRef idx="1">
-              <a:schemeClr val="accent1"/>
-            </a:lnRef>
-            <a:fillRef idx="0">
-              <a:schemeClr val="accent1"/>
-            </a:fillRef>
-            <a:effectRef idx="0">
-              <a:schemeClr val="accent1"/>
-            </a:effectRef>
-            <a:fontRef idx="minor">
-              <a:schemeClr val="tx1"/>
-            </a:fontRef>
-          </p:style>
-        </p:cxnSp>
-        <p:cxnSp>
-          <p:nvCxnSpPr>
-            <p:cNvPr id="20" name="Straight Connector 19">
-              <a:extLst>
-                <a:ext uri="{FF2B5EF4-FFF2-40B4-BE49-F238E27FC236}">
-                  <a16:creationId xmlns:a16="http://schemas.microsoft.com/office/drawing/2014/main" id="{47B15501-CB9A-4642-80EE-2876EF039EB8}"/>
-                </a:ext>
-                <a:ext uri="{C183D7F6-B498-43B3-948B-1728B52AA6E4}">
-                  <adec:decorative xmlns:adec="http://schemas.microsoft.com/office/drawing/2017/decorative" val="1"/>
-                </a:ext>
-              </a:extLst>
-            </p:cNvPr>
-            <p:cNvCxnSpPr/>
-            <p:nvPr>
-              <p:extLst>
-                <p:ext uri="{386F3935-93C4-4BCD-93E2-E3B085C9AB24}">
-                  <p16:designElem xmlns:p16="http://schemas.microsoft.com/office/powerpoint/2015/main" val="1"/>
-                </p:ext>
-              </p:extLst>
-            </p:nvPr>
-          </p:nvCxnSpPr>
-          <p:spPr>
-            <a:xfrm>
-              <a:off x="6941820" y="1267730"/>
-              <a:ext cx="0" cy="612648"/>
-            </a:xfrm>
-            <a:prstGeom prst="line">
-              <a:avLst/>
-            </a:prstGeom>
-            <a:solidFill>
-              <a:schemeClr val="tx1">
-                <a:lumMod val="85000"/>
-                <a:lumOff val="15000"/>
-              </a:schemeClr>
-            </a:solidFill>
-            <a:ln>
-              <a:solidFill>
-                <a:srgbClr val="FFFFFF"/>
-              </a:solidFill>
-              <a:miter lim="800000"/>
-            </a:ln>
-          </p:spPr>
-          <p:style>
-            <a:lnRef idx="1">
-              <a:schemeClr val="accent1"/>
-            </a:lnRef>
-            <a:fillRef idx="0">
-              <a:schemeClr val="accent1"/>
-            </a:fillRef>
-            <a:effectRef idx="0">
-              <a:schemeClr val="accent1"/>
-            </a:effectRef>
-            <a:fontRef idx="minor">
-              <a:schemeClr val="tx1"/>
-            </a:fontRef>
-          </p:style>
-        </p:cxnSp>
-        <p:cxnSp>
-          <p:nvCxnSpPr>
-            <p:cNvPr id="21" name="Straight Connector 20">
-              <a:extLst>
-                <a:ext uri="{FF2B5EF4-FFF2-40B4-BE49-F238E27FC236}">
-                  <a16:creationId xmlns:a16="http://schemas.microsoft.com/office/drawing/2014/main" id="{6AFF9525-325F-47B3-A63C-93C12253AD76}"/>
-                </a:ext>
-                <a:ext uri="{C183D7F6-B498-43B3-948B-1728B52AA6E4}">
-                  <adec:decorative xmlns:adec="http://schemas.microsoft.com/office/drawing/2017/decorative" val="1"/>
-                </a:ext>
-              </a:extLst>
-            </p:cNvPr>
-            <p:cNvCxnSpPr/>
-            <p:nvPr>
-              <p:extLst>
-                <p:ext uri="{386F3935-93C4-4BCD-93E2-E3B085C9AB24}">
-                  <p16:designElem xmlns:p16="http://schemas.microsoft.com/office/powerpoint/2015/main" val="1"/>
-                </p:ext>
-              </p:extLst>
-            </p:nvPr>
-          </p:nvCxnSpPr>
-          <p:spPr>
-            <a:xfrm>
-              <a:off x="5250180" y="1883664"/>
-              <a:ext cx="1691640" cy="0"/>
-            </a:xfrm>
-            <a:prstGeom prst="line">
-              <a:avLst/>
-            </a:prstGeom>
-            <a:solidFill>
-              <a:schemeClr val="tx1">
-                <a:lumMod val="85000"/>
-                <a:lumOff val="15000"/>
-              </a:schemeClr>
-            </a:solidFill>
-            <a:ln>
-              <a:solidFill>
-                <a:srgbClr val="FFFFFF"/>
-              </a:solidFill>
-              <a:miter lim="800000"/>
-            </a:ln>
-          </p:spPr>
-          <p:style>
-            <a:lnRef idx="1">
-              <a:schemeClr val="accent1"/>
-            </a:lnRef>
-            <a:fillRef idx="0">
-              <a:schemeClr val="accent1"/>
-            </a:fillRef>
-            <a:effectRef idx="0">
-              <a:schemeClr val="accent1"/>
-            </a:effectRef>
-            <a:fontRef idx="minor">
-              <a:schemeClr val="tx1"/>
-            </a:fontRef>
-          </p:style>
-        </p:cxnSp>
-      </p:grpSp>
-      <p:sp>
-        <p:nvSpPr>
-          <p:cNvPr id="23" name="Rectangle 22">
-            <a:extLst>
-              <a:ext uri="{FF2B5EF4-FFF2-40B4-BE49-F238E27FC236}">
-                <a16:creationId xmlns:a16="http://schemas.microsoft.com/office/drawing/2014/main" id="{B66F8A2C-B8CF-4B20-9A73-2ADCF6302755}"/>
-              </a:ext>
-              <a:ext uri="{C183D7F6-B498-43B3-948B-1728B52AA6E4}">
-                <adec:decorative xmlns:adec="http://schemas.microsoft.com/office/drawing/2017/decorative" val="1"/>
-              </a:ext>
-            </a:extLst>
-          </p:cNvPr>
-          <p:cNvSpPr>
-            <a:spLocks noGrp="1" noRot="1" noChangeAspect="1" noMove="1" noResize="1" noEditPoints="1" noAdjustHandles="1" noChangeArrowheads="1" noChangeShapeType="1" noTextEdit="1"/>
-          </p:cNvSpPr>
-          <p:nvPr>
-            <p:extLst>
-              <p:ext uri="{386F3935-93C4-4BCD-93E2-E3B085C9AB24}">
-                <p16:designElem xmlns:p16="http://schemas.microsoft.com/office/powerpoint/2015/main" val="1"/>
-              </p:ext>
-            </p:extLst>
-          </p:nvPr>
-        </p:nvSpPr>
-        <p:spPr>
-          <a:xfrm>
-            <a:off x="0" y="0"/>
-            <a:ext cx="12192001" cy="6858000"/>
-          </a:xfrm>
-          <a:prstGeom prst="rect">
-            <a:avLst/>
-          </a:prstGeom>
-          <a:solidFill>
-            <a:schemeClr val="tx1">
-              <a:lumMod val="85000"/>
-            </a:schemeClr>
-          </a:solidFill>
-          <a:ln>
-            <a:noFill/>
-          </a:ln>
-        </p:spPr>
-        <p:style>
-          <a:lnRef idx="2">
-            <a:schemeClr val="accent1">
-              <a:shade val="50000"/>
-            </a:schemeClr>
-          </a:lnRef>
-          <a:fillRef idx="1">
-            <a:schemeClr val="accent1"/>
-          </a:fillRef>
-          <a:effectRef idx="0">
-            <a:schemeClr val="accent1"/>
-          </a:effectRef>
-          <a:fontRef idx="minor">
-            <a:schemeClr val="lt1"/>
-          </a:fontRef>
-        </p:style>
-        <p:txBody>
-          <a:bodyPr rot="0" spcFirstLastPara="0" vert="horz" wrap="square" lIns="91440" tIns="45720" rIns="91440" bIns="45720" numCol="1" spcCol="0" rtlCol="0" fromWordArt="0" anchor="ctr" anchorCtr="0" forceAA="0" compatLnSpc="1">
-            <a:prstTxWarp prst="textNoShape">
-              <a:avLst/>
-            </a:prstTxWarp>
-            <a:noAutofit/>
-          </a:bodyPr>
-          <a:lstStyle>
-            <a:defPPr>
-              <a:defRPr lang="en-US"/>
-            </a:defPPr>
-            <a:lvl1pPr marL="0" algn="l" defTabSz="914400" rtl="0" eaLnBrk="1" latinLnBrk="0" hangingPunct="1">
-              <a:defRPr sz="1800" kern="1200">
-                <a:solidFill>
-                  <a:schemeClr val="lt1"/>
-                </a:solidFill>
-                <a:latin typeface="+mn-lt"/>
-                <a:ea typeface="+mn-ea"/>
-                <a:cs typeface="+mn-cs"/>
-              </a:defRPr>
-            </a:lvl1pPr>
-            <a:lvl2pPr marL="457200" algn="l" defTabSz="914400" rtl="0" eaLnBrk="1" latinLnBrk="0" hangingPunct="1">
-              <a:defRPr sz="1800" kern="1200">
-                <a:solidFill>
-                  <a:schemeClr val="lt1"/>
-                </a:solidFill>
-                <a:latin typeface="+mn-lt"/>
-                <a:ea typeface="+mn-ea"/>
-                <a:cs typeface="+mn-cs"/>
-              </a:defRPr>
-            </a:lvl2pPr>
-            <a:lvl3pPr marL="914400" algn="l" defTabSz="914400" rtl="0" eaLnBrk="1" latinLnBrk="0" hangingPunct="1">
-              <a:defRPr sz="1800" kern="1200">
-                <a:solidFill>
-                  <a:schemeClr val="lt1"/>
-                </a:solidFill>
-                <a:latin typeface="+mn-lt"/>
-                <a:ea typeface="+mn-ea"/>
-                <a:cs typeface="+mn-cs"/>
-              </a:defRPr>
-            </a:lvl3pPr>
-            <a:lvl4pPr marL="1371600" algn="l" defTabSz="914400" rtl="0" eaLnBrk="1" latinLnBrk="0" hangingPunct="1">
-              <a:defRPr sz="1800" kern="1200">
-                <a:solidFill>
-                  <a:schemeClr val="lt1"/>
-                </a:solidFill>
-                <a:latin typeface="+mn-lt"/>
-                <a:ea typeface="+mn-ea"/>
-                <a:cs typeface="+mn-cs"/>
-              </a:defRPr>
-            </a:lvl4pPr>
-            <a:lvl5pPr marL="1828800" algn="l" defTabSz="914400" rtl="0" eaLnBrk="1" latinLnBrk="0" hangingPunct="1">
-              <a:defRPr sz="1800" kern="1200">
-                <a:solidFill>
-                  <a:schemeClr val="lt1"/>
-                </a:solidFill>
-                <a:latin typeface="+mn-lt"/>
-                <a:ea typeface="+mn-ea"/>
-                <a:cs typeface="+mn-cs"/>
-              </a:defRPr>
-            </a:lvl5pPr>
-            <a:lvl6pPr marL="2286000" algn="l" defTabSz="914400" rtl="0" eaLnBrk="1" latinLnBrk="0" hangingPunct="1">
-              <a:defRPr sz="1800" kern="1200">
-                <a:solidFill>
-                  <a:schemeClr val="lt1"/>
-                </a:solidFill>
-                <a:latin typeface="+mn-lt"/>
-                <a:ea typeface="+mn-ea"/>
-                <a:cs typeface="+mn-cs"/>
-              </a:defRPr>
-            </a:lvl6pPr>
-            <a:lvl7pPr marL="2743200" algn="l" defTabSz="914400" rtl="0" eaLnBrk="1" latinLnBrk="0" hangingPunct="1">
-              <a:defRPr sz="1800" kern="1200">
-                <a:solidFill>
-                  <a:schemeClr val="lt1"/>
-                </a:solidFill>
-                <a:latin typeface="+mn-lt"/>
-                <a:ea typeface="+mn-ea"/>
-                <a:cs typeface="+mn-cs"/>
-              </a:defRPr>
-            </a:lvl7pPr>
-            <a:lvl8pPr marL="3200400" algn="l" defTabSz="914400" rtl="0" eaLnBrk="1" latinLnBrk="0" hangingPunct="1">
-              <a:defRPr sz="1800" kern="1200">
-                <a:solidFill>
-                  <a:schemeClr val="lt1"/>
-                </a:solidFill>
-                <a:latin typeface="+mn-lt"/>
-                <a:ea typeface="+mn-ea"/>
-                <a:cs typeface="+mn-cs"/>
-              </a:defRPr>
-            </a:lvl8pPr>
-            <a:lvl9pPr marL="3657600" algn="l" defTabSz="914400" rtl="0" eaLnBrk="1" latinLnBrk="0" hangingPunct="1">
-              <a:defRPr sz="1800" kern="1200">
-                <a:solidFill>
-                  <a:schemeClr val="lt1"/>
-                </a:solidFill>
-                <a:latin typeface="+mn-lt"/>
-                <a:ea typeface="+mn-ea"/>
-                <a:cs typeface="+mn-cs"/>
-              </a:defRPr>
-            </a:lvl9pPr>
-          </a:lstStyle>
-          <a:p>
-            <a:pPr algn="ctr"/>
-            <a:endParaRPr lang="en-US"/>
-          </a:p>
-        </p:txBody>
-      </p:sp>
-      <p:sp>
-        <p:nvSpPr>
-          <p:cNvPr id="25" name="Rectangle 24">
-            <a:extLst>
-              <a:ext uri="{FF2B5EF4-FFF2-40B4-BE49-F238E27FC236}">
-                <a16:creationId xmlns:a16="http://schemas.microsoft.com/office/drawing/2014/main" id="{B5DD78E9-DE0D-47AF-A0DB-F475221E3DC7}"/>
-              </a:ext>
-              <a:ext uri="{C183D7F6-B498-43B3-948B-1728B52AA6E4}">
-                <adec:decorative xmlns:adec="http://schemas.microsoft.com/office/drawing/2017/decorative" val="1"/>
-              </a:ext>
-            </a:extLst>
-          </p:cNvPr>
-          <p:cNvSpPr>
-            <a:spLocks noGrp="1" noRot="1" noChangeAspect="1" noMove="1" noResize="1" noEditPoints="1" noAdjustHandles="1" noChangeArrowheads="1" noChangeShapeType="1" noTextEdit="1"/>
-          </p:cNvSpPr>
-          <p:nvPr>
-            <p:extLst>
-              <p:ext uri="{386F3935-93C4-4BCD-93E2-E3B085C9AB24}">
-                <p16:designElem xmlns:p16="http://schemas.microsoft.com/office/powerpoint/2015/main" val="1"/>
-              </p:ext>
-            </p:extLst>
-          </p:nvPr>
-        </p:nvSpPr>
-        <p:spPr>
-          <a:xfrm>
-            <a:off x="632108" y="610955"/>
-            <a:ext cx="10927784" cy="5636090"/>
-          </a:xfrm>
-          <a:prstGeom prst="rect">
-            <a:avLst/>
-          </a:prstGeom>
-          <a:solidFill>
-            <a:srgbClr val="FFFFFF"/>
-          </a:solidFill>
-          <a:ln w="6350" cap="flat" cmpd="sng" algn="ctr">
-            <a:noFill/>
-            <a:prstDash val="solid"/>
-          </a:ln>
-          <a:effectLst>
-            <a:outerShdw blurRad="50800" algn="ctr" rotWithShape="0">
-              <a:prstClr val="black">
-                <a:alpha val="66000"/>
-              </a:prstClr>
-            </a:outerShdw>
-            <a:softEdge rad="0"/>
-          </a:effectLst>
-        </p:spPr>
-      </p:sp>
-      <p:sp>
-        <p:nvSpPr>
-          <p:cNvPr id="27" name="Rectangle 26">
-            <a:extLst>
-              <a:ext uri="{FF2B5EF4-FFF2-40B4-BE49-F238E27FC236}">
-                <a16:creationId xmlns:a16="http://schemas.microsoft.com/office/drawing/2014/main" id="{A118D329-2010-4A15-B57C-429FFAE35B11}"/>
-              </a:ext>
-              <a:ext uri="{C183D7F6-B498-43B3-948B-1728B52AA6E4}">
-                <adec:decorative xmlns:adec="http://schemas.microsoft.com/office/drawing/2017/decorative" val="1"/>
-              </a:ext>
-            </a:extLst>
-          </p:cNvPr>
-          <p:cNvSpPr>
-            <a:spLocks noGrp="1" noRot="1" noChangeAspect="1" noMove="1" noResize="1" noEditPoints="1" noAdjustHandles="1" noChangeArrowheads="1" noChangeShapeType="1" noTextEdit="1"/>
-          </p:cNvSpPr>
-          <p:nvPr>
-            <p:extLst>
-              <p:ext uri="{386F3935-93C4-4BCD-93E2-E3B085C9AB24}">
-                <p16:designElem xmlns:p16="http://schemas.microsoft.com/office/powerpoint/2015/main" val="1"/>
-              </p:ext>
-            </p:extLst>
-          </p:nvPr>
-        </p:nvSpPr>
-        <p:spPr>
-          <a:xfrm>
-            <a:off x="797052" y="777240"/>
-            <a:ext cx="10597896" cy="5303520"/>
-          </a:xfrm>
-          <a:prstGeom prst="rect">
-            <a:avLst/>
-          </a:prstGeom>
-          <a:solidFill>
-            <a:schemeClr val="bg1">
-              <a:lumMod val="85000"/>
-              <a:lumOff val="15000"/>
-            </a:schemeClr>
-          </a:solidFill>
-          <a:ln w="6350" cap="sq" cmpd="sng" algn="ctr">
-            <a:solidFill>
-              <a:schemeClr val="tx1"/>
-            </a:solidFill>
-            <a:prstDash val="solid"/>
-            <a:miter lim="800000"/>
-          </a:ln>
-          <a:effectLst/>
-        </p:spPr>
-      </p:sp>
-      <p:sp>
-        <p:nvSpPr>
-          <p:cNvPr id="4" name="Title 3">
-            <a:extLst>
-              <a:ext uri="{FF2B5EF4-FFF2-40B4-BE49-F238E27FC236}">
-                <a16:creationId xmlns:a16="http://schemas.microsoft.com/office/drawing/2014/main" id="{6BA491B6-34AC-4612-88A4-CFC5B0107376}"/>
-              </a:ext>
-            </a:extLst>
-          </p:cNvPr>
-          <p:cNvSpPr>
-            <a:spLocks noGrp="1"/>
-          </p:cNvSpPr>
-          <p:nvPr>
-            <p:ph type="title"/>
-          </p:nvPr>
-        </p:nvSpPr>
-        <p:spPr>
-          <a:xfrm>
-            <a:off x="1263520" y="1272800"/>
-            <a:ext cx="6544620" cy="4312402"/>
-          </a:xfrm>
-        </p:spPr>
-        <p:txBody>
-          <a:bodyPr vert="horz" lIns="91440" tIns="45720" rIns="91440" bIns="45720" rtlCol="0" anchor="ctr">
-            <a:normAutofit/>
-          </a:bodyPr>
-          <a:lstStyle/>
-          <a:p>
-            <a:pPr algn="r"/>
-            <a:r>
-              <a:rPr lang="en-US">
-                <a:solidFill>
-                  <a:schemeClr val="tx1"/>
-                </a:solidFill>
-              </a:rPr>
-              <a:t>CRUD</a:t>
-            </a:r>
-          </a:p>
-        </p:txBody>
-      </p:sp>
-      <p:sp>
-        <p:nvSpPr>
-          <p:cNvPr id="5" name="Text Placeholder 4">
-            <a:extLst>
-              <a:ext uri="{FF2B5EF4-FFF2-40B4-BE49-F238E27FC236}">
-                <a16:creationId xmlns:a16="http://schemas.microsoft.com/office/drawing/2014/main" id="{44791B1E-427A-47A6-A74A-5FBF8847B851}"/>
-              </a:ext>
-            </a:extLst>
-          </p:cNvPr>
-          <p:cNvSpPr>
-            <a:spLocks noGrp="1"/>
-          </p:cNvSpPr>
-          <p:nvPr>
-            <p:ph type="body" idx="1"/>
-          </p:nvPr>
-        </p:nvSpPr>
-        <p:spPr>
-          <a:xfrm>
-            <a:off x="8473440" y="1272800"/>
-            <a:ext cx="2902864" cy="4312402"/>
-          </a:xfrm>
-        </p:spPr>
-        <p:txBody>
-          <a:bodyPr vert="horz" lIns="91440" tIns="45720" rIns="91440" bIns="45720" rtlCol="0" anchor="ctr">
-            <a:normAutofit/>
-          </a:bodyPr>
-          <a:lstStyle/>
-          <a:p>
-            <a:pPr algn="l">
-              <a:lnSpc>
-                <a:spcPct val="100000"/>
-              </a:lnSpc>
-              <a:spcBef>
-                <a:spcPts val="0"/>
-              </a:spcBef>
-            </a:pPr>
-            <a:r>
-              <a:rPr lang="en-US" spc="80"/>
-              <a:t>Reading &amp; Writing data with MongoDB</a:t>
-            </a:r>
-          </a:p>
-        </p:txBody>
-      </p:sp>
-      <p:cxnSp>
-        <p:nvCxnSpPr>
-          <p:cNvPr id="29" name="Straight Connector 28">
-            <a:extLst>
-              <a:ext uri="{FF2B5EF4-FFF2-40B4-BE49-F238E27FC236}">
-                <a16:creationId xmlns:a16="http://schemas.microsoft.com/office/drawing/2014/main" id="{994262BC-EE98-4BD6-82DB-4955E8DCC290}"/>
-              </a:ext>
-              <a:ext uri="{C183D7F6-B498-43B3-948B-1728B52AA6E4}">
-                <adec:decorative xmlns:adec="http://schemas.microsoft.com/office/drawing/2017/decorative" val="1"/>
-              </a:ext>
-            </a:extLst>
-          </p:cNvPr>
-          <p:cNvCxnSpPr>
-            <a:cxnSpLocks noGrp="1" noRot="1" noChangeAspect="1" noMove="1" noResize="1" noEditPoints="1" noAdjustHandles="1" noChangeArrowheads="1" noChangeShapeType="1"/>
-          </p:cNvCxnSpPr>
-          <p:nvPr>
-            <p:extLst>
-              <p:ext uri="{386F3935-93C4-4BCD-93E2-E3B085C9AB24}">
-                <p16:designElem xmlns:p16="http://schemas.microsoft.com/office/powerpoint/2015/main" val="1"/>
-              </p:ext>
-            </p:extLst>
-          </p:nvPr>
-        </p:nvCxnSpPr>
-        <p:spPr>
-          <a:xfrm>
-            <a:off x="8129872" y="2057401"/>
-            <a:ext cx="0" cy="2743200"/>
-          </a:xfrm>
-          <a:prstGeom prst="line">
-            <a:avLst/>
-          </a:prstGeom>
-          <a:ln w="12700">
-            <a:solidFill>
-              <a:schemeClr val="tx1">
-                <a:lumMod val="75000"/>
-                <a:lumOff val="25000"/>
-              </a:schemeClr>
-            </a:solidFill>
-          </a:ln>
-        </p:spPr>
-        <p:style>
-          <a:lnRef idx="1">
-            <a:schemeClr val="accent1"/>
-          </a:lnRef>
-          <a:fillRef idx="0">
-            <a:schemeClr val="accent1"/>
-          </a:fillRef>
-          <a:effectRef idx="0">
-            <a:schemeClr val="accent1"/>
-          </a:effectRef>
-          <a:fontRef idx="minor">
-            <a:schemeClr val="tx1"/>
-          </a:fontRef>
-        </p:style>
-      </p:cxnSp>
-    </p:spTree>
-    <p:extLst>
-      <p:ext uri="{BB962C8B-B14F-4D97-AF65-F5344CB8AC3E}">
-        <p14:creationId xmlns:p14="http://schemas.microsoft.com/office/powerpoint/2010/main" val="1985472191"/>
-      </p:ext>
-    </p:extLst>
-  </p:cSld>
-  <p:clrMapOvr>
-    <a:overrideClrMapping bg1="dk1" tx1="lt1" bg2="dk2" tx2="lt2" accent1="accent1" accent2="accent2" accent3="accent3" accent4="accent4" accent5="accent5" accent6="accent6" hlink="hlink" folHlink="folHlink"/>
-  </p:clrMapOvr>
-</p:sld>
-</file>
-
-<file path=ppt/slides/slide34.xml><?xml version="1.0" encoding="utf-8"?>
-<p:sld xmlns:a="http://schemas.openxmlformats.org/drawingml/2006/main" xmlns:r="http://schemas.openxmlformats.org/officeDocument/2006/relationships" xmlns:p="http://schemas.openxmlformats.org/presentationml/2006/main">
-  <p:cSld>
-    <p:spTree>
-      <p:nvGrpSpPr>
-        <p:cNvPr id="1" name=""/>
-        <p:cNvGrpSpPr/>
-        <p:nvPr/>
-      </p:nvGrpSpPr>
-      <p:grpSpPr>
-        <a:xfrm>
-          <a:off x="0" y="0"/>
-          <a:ext cx="0" cy="0"/>
-          <a:chOff x="0" y="0"/>
-          <a:chExt cx="0" cy="0"/>
-        </a:xfrm>
-      </p:grpSpPr>
-      <p:sp>
-        <p:nvSpPr>
-          <p:cNvPr id="2" name="Title 1">
-            <a:extLst>
-              <a:ext uri="{FF2B5EF4-FFF2-40B4-BE49-F238E27FC236}">
-                <a16:creationId xmlns:a16="http://schemas.microsoft.com/office/drawing/2014/main" id="{B21BD03D-ECBB-4D28-A750-B437AF7FA804}"/>
-              </a:ext>
-            </a:extLst>
-          </p:cNvPr>
-          <p:cNvSpPr>
-            <a:spLocks noGrp="1"/>
-          </p:cNvSpPr>
-          <p:nvPr>
-            <p:ph type="title"/>
-          </p:nvPr>
-        </p:nvSpPr>
-        <p:spPr/>
-        <p:txBody>
-          <a:bodyPr/>
-          <a:lstStyle/>
-          <a:p>
-            <a:r>
-              <a:rPr lang="en-US" dirty="0"/>
-              <a:t>CRUD</a:t>
-            </a:r>
-          </a:p>
-        </p:txBody>
-      </p:sp>
-      <p:sp>
-        <p:nvSpPr>
-          <p:cNvPr id="3" name="Content Placeholder 2">
-            <a:extLst>
-              <a:ext uri="{FF2B5EF4-FFF2-40B4-BE49-F238E27FC236}">
-                <a16:creationId xmlns:a16="http://schemas.microsoft.com/office/drawing/2014/main" id="{145085C8-2D6A-47B6-A2EA-0EE6E7FDBB1B}"/>
-              </a:ext>
-            </a:extLst>
-          </p:cNvPr>
-          <p:cNvSpPr>
-            <a:spLocks noGrp="1"/>
-          </p:cNvSpPr>
-          <p:nvPr>
-            <p:ph idx="1"/>
-          </p:nvPr>
-        </p:nvSpPr>
-        <p:spPr>
-          <a:xfrm>
-            <a:off x="1066800" y="5201174"/>
-            <a:ext cx="10058400" cy="751570"/>
-          </a:xfrm>
-        </p:spPr>
-        <p:txBody>
-          <a:bodyPr/>
-          <a:lstStyle/>
-          <a:p>
-            <a:pPr marL="0" indent="0">
-              <a:buNone/>
-            </a:pPr>
-            <a:r>
-              <a:rPr lang="en-US" b="1" dirty="0"/>
-              <a:t>Sources</a:t>
-            </a:r>
-          </a:p>
-          <a:p>
-            <a:pPr marL="0" indent="0">
-              <a:buNone/>
-            </a:pPr>
-            <a:r>
-              <a:rPr lang="en-US" dirty="0">
-                <a:hlinkClick r:id="rId2"/>
-              </a:rPr>
-              <a:t>https://en.wikipedia.org/wiki/Create,_read,_update_and_delete</a:t>
-            </a:r>
-            <a:endParaRPr lang="en-US" dirty="0"/>
-          </a:p>
-        </p:txBody>
-      </p:sp>
-      <p:graphicFrame>
-        <p:nvGraphicFramePr>
-          <p:cNvPr id="4" name="Table 4">
-            <a:extLst>
-              <a:ext uri="{FF2B5EF4-FFF2-40B4-BE49-F238E27FC236}">
-                <a16:creationId xmlns:a16="http://schemas.microsoft.com/office/drawing/2014/main" id="{6715BB89-4FD3-448F-95AF-7B13C708E8E1}"/>
-              </a:ext>
-            </a:extLst>
-          </p:cNvPr>
-          <p:cNvGraphicFramePr>
-            <a:graphicFrameLocks noGrp="1"/>
-          </p:cNvGraphicFramePr>
-          <p:nvPr>
-            <p:extLst>
-              <p:ext uri="{D42A27DB-BD31-4B8C-83A1-F6EECF244321}">
-                <p14:modId xmlns:p14="http://schemas.microsoft.com/office/powerpoint/2010/main" val="1898750440"/>
-              </p:ext>
-            </p:extLst>
-          </p:nvPr>
-        </p:nvGraphicFramePr>
-        <p:xfrm>
-          <a:off x="1721840" y="2173585"/>
-          <a:ext cx="8748320" cy="1854200"/>
-        </p:xfrm>
-        <a:graphic>
-          <a:graphicData uri="http://schemas.openxmlformats.org/drawingml/2006/table">
-            <a:tbl>
-              <a:tblPr firstRow="1" bandRow="1">
-                <a:tableStyleId>{5C22544A-7EE6-4342-B048-85BDC9FD1C3A}</a:tableStyleId>
-              </a:tblPr>
-              <a:tblGrid>
-                <a:gridCol w="2187080">
-                  <a:extLst>
-                    <a:ext uri="{9D8B030D-6E8A-4147-A177-3AD203B41FA5}">
-                      <a16:colId xmlns:a16="http://schemas.microsoft.com/office/drawing/2014/main" val="1167836049"/>
-                    </a:ext>
-                  </a:extLst>
-                </a:gridCol>
-                <a:gridCol w="2187080">
-                  <a:extLst>
-                    <a:ext uri="{9D8B030D-6E8A-4147-A177-3AD203B41FA5}">
-                      <a16:colId xmlns:a16="http://schemas.microsoft.com/office/drawing/2014/main" val="2733711110"/>
-                    </a:ext>
-                  </a:extLst>
-                </a:gridCol>
-                <a:gridCol w="2187080">
-                  <a:extLst>
-                    <a:ext uri="{9D8B030D-6E8A-4147-A177-3AD203B41FA5}">
-                      <a16:colId xmlns:a16="http://schemas.microsoft.com/office/drawing/2014/main" val="2967705745"/>
-                    </a:ext>
-                  </a:extLst>
-                </a:gridCol>
-                <a:gridCol w="2187080">
-                  <a:extLst>
-                    <a:ext uri="{9D8B030D-6E8A-4147-A177-3AD203B41FA5}">
-                      <a16:colId xmlns:a16="http://schemas.microsoft.com/office/drawing/2014/main" val="2265588440"/>
-                    </a:ext>
-                  </a:extLst>
-                </a:gridCol>
-              </a:tblGrid>
-              <a:tr h="370840">
-                <a:tc>
-                  <a:txBody>
-                    <a:bodyPr/>
-                    <a:lstStyle/>
-                    <a:p>
-                      <a:pPr algn="ctr"/>
-                      <a:r>
-                        <a:rPr lang="en-US" dirty="0"/>
-                        <a:t>Operation</a:t>
-                      </a:r>
-                    </a:p>
-                  </a:txBody>
-                  <a:tcPr/>
-                </a:tc>
-                <a:tc>
-                  <a:txBody>
-                    <a:bodyPr/>
-                    <a:lstStyle/>
-                    <a:p>
-                      <a:pPr algn="ctr"/>
-                      <a:r>
-                        <a:rPr lang="en-US" dirty="0"/>
-                        <a:t>SQL</a:t>
-                      </a:r>
-                    </a:p>
-                  </a:txBody>
-                  <a:tcPr/>
-                </a:tc>
-                <a:tc>
-                  <a:txBody>
-                    <a:bodyPr/>
-                    <a:lstStyle/>
-                    <a:p>
-                      <a:pPr algn="ctr"/>
-                      <a:r>
-                        <a:rPr lang="en-US" dirty="0"/>
-                        <a:t>MongoDB</a:t>
-                      </a:r>
-                    </a:p>
-                  </a:txBody>
-                  <a:tcPr/>
-                </a:tc>
-                <a:tc>
-                  <a:txBody>
-                    <a:bodyPr/>
-                    <a:lstStyle/>
-                    <a:p>
-                      <a:pPr algn="ctr"/>
-                      <a:r>
-                        <a:rPr lang="en-US" dirty="0"/>
-                        <a:t>HTTP</a:t>
-                      </a:r>
-                    </a:p>
-                  </a:txBody>
-                  <a:tcPr/>
-                </a:tc>
-                <a:extLst>
-                  <a:ext uri="{0D108BD9-81ED-4DB2-BD59-A6C34878D82A}">
-                    <a16:rowId xmlns:a16="http://schemas.microsoft.com/office/drawing/2014/main" val="2776846509"/>
-                  </a:ext>
-                </a:extLst>
-              </a:tr>
-              <a:tr h="370840">
-                <a:tc>
-                  <a:txBody>
-                    <a:bodyPr/>
-                    <a:lstStyle/>
-                    <a:p>
-                      <a:pPr algn="l"/>
-                      <a:r>
-                        <a:rPr lang="en-US" b="1" dirty="0"/>
-                        <a:t>C</a:t>
-                      </a:r>
-                      <a:r>
-                        <a:rPr lang="en-US" dirty="0"/>
-                        <a:t>reate</a:t>
-                      </a:r>
-                    </a:p>
-                  </a:txBody>
-                  <a:tcPr/>
-                </a:tc>
-                <a:tc>
-                  <a:txBody>
-                    <a:bodyPr/>
-                    <a:lstStyle/>
-                    <a:p>
-                      <a:pPr algn="l"/>
-                      <a:r>
-                        <a:rPr lang="en-US" dirty="0"/>
-                        <a:t>insert</a:t>
-                      </a:r>
-                    </a:p>
-                  </a:txBody>
-                  <a:tcPr/>
-                </a:tc>
-                <a:tc>
-                  <a:txBody>
-                    <a:bodyPr/>
-                    <a:lstStyle/>
-                    <a:p>
-                      <a:pPr algn="l"/>
-                      <a:r>
-                        <a:rPr lang="en-US" dirty="0"/>
-                        <a:t>insert</a:t>
-                      </a:r>
-                    </a:p>
-                  </a:txBody>
-                  <a:tcPr/>
-                </a:tc>
-                <a:tc>
-                  <a:txBody>
-                    <a:bodyPr/>
-                    <a:lstStyle/>
-                    <a:p>
-                      <a:pPr algn="l"/>
-                      <a:r>
-                        <a:rPr lang="en-US" dirty="0"/>
-                        <a:t>POST</a:t>
-                      </a:r>
-                    </a:p>
-                  </a:txBody>
-                  <a:tcPr/>
-                </a:tc>
-                <a:extLst>
-                  <a:ext uri="{0D108BD9-81ED-4DB2-BD59-A6C34878D82A}">
-                    <a16:rowId xmlns:a16="http://schemas.microsoft.com/office/drawing/2014/main" val="201827191"/>
-                  </a:ext>
-                </a:extLst>
-              </a:tr>
-              <a:tr h="370840">
-                <a:tc>
-                  <a:txBody>
-                    <a:bodyPr/>
-                    <a:lstStyle/>
-                    <a:p>
-                      <a:pPr algn="l"/>
-                      <a:r>
-                        <a:rPr lang="en-US" b="1" dirty="0"/>
-                        <a:t>R</a:t>
-                      </a:r>
-                      <a:r>
-                        <a:rPr lang="en-US" dirty="0"/>
-                        <a:t>ead/Retrieve</a:t>
-                      </a:r>
-                    </a:p>
-                  </a:txBody>
-                  <a:tcPr/>
-                </a:tc>
-                <a:tc>
-                  <a:txBody>
-                    <a:bodyPr/>
-                    <a:lstStyle/>
-                    <a:p>
-                      <a:pPr algn="l"/>
-                      <a:r>
-                        <a:rPr lang="en-US" dirty="0"/>
-                        <a:t>select</a:t>
-                      </a:r>
-                    </a:p>
-                  </a:txBody>
-                  <a:tcPr/>
-                </a:tc>
-                <a:tc>
-                  <a:txBody>
-                    <a:bodyPr/>
-                    <a:lstStyle/>
-                    <a:p>
-                      <a:pPr algn="l"/>
-                      <a:r>
-                        <a:rPr lang="en-US" dirty="0"/>
-                        <a:t>find</a:t>
-                      </a:r>
-                    </a:p>
-                  </a:txBody>
-                  <a:tcPr/>
-                </a:tc>
-                <a:tc>
-                  <a:txBody>
-                    <a:bodyPr/>
-                    <a:lstStyle/>
-                    <a:p>
-                      <a:pPr algn="l"/>
-                      <a:r>
-                        <a:rPr lang="en-US" dirty="0"/>
-                        <a:t>GET</a:t>
-                      </a:r>
-                    </a:p>
-                  </a:txBody>
-                  <a:tcPr/>
-                </a:tc>
-                <a:extLst>
-                  <a:ext uri="{0D108BD9-81ED-4DB2-BD59-A6C34878D82A}">
-                    <a16:rowId xmlns:a16="http://schemas.microsoft.com/office/drawing/2014/main" val="4144423719"/>
-                  </a:ext>
-                </a:extLst>
-              </a:tr>
-              <a:tr h="370840">
-                <a:tc>
-                  <a:txBody>
-                    <a:bodyPr/>
-                    <a:lstStyle/>
-                    <a:p>
-                      <a:pPr algn="l"/>
-                      <a:r>
-                        <a:rPr lang="en-US" b="1" dirty="0"/>
-                        <a:t>U</a:t>
-                      </a:r>
-                      <a:r>
-                        <a:rPr lang="en-US" dirty="0"/>
-                        <a:t>pdate/Modify</a:t>
-                      </a:r>
-                    </a:p>
-                  </a:txBody>
-                  <a:tcPr/>
-                </a:tc>
-                <a:tc>
-                  <a:txBody>
-                    <a:bodyPr/>
-                    <a:lstStyle/>
-                    <a:p>
-                      <a:pPr algn="l"/>
-                      <a:r>
-                        <a:rPr lang="en-US" dirty="0"/>
-                        <a:t>update</a:t>
-                      </a:r>
-                    </a:p>
-                  </a:txBody>
-                  <a:tcPr/>
-                </a:tc>
-                <a:tc>
-                  <a:txBody>
-                    <a:bodyPr/>
-                    <a:lstStyle/>
-                    <a:p>
-                      <a:pPr algn="l"/>
-                      <a:r>
-                        <a:rPr lang="en-US" dirty="0"/>
-                        <a:t>update</a:t>
-                      </a:r>
-                    </a:p>
-                  </a:txBody>
-                  <a:tcPr/>
-                </a:tc>
-                <a:tc>
-                  <a:txBody>
-                    <a:bodyPr/>
-                    <a:lstStyle/>
-                    <a:p>
-                      <a:pPr algn="l"/>
-                      <a:r>
-                        <a:rPr lang="en-US" dirty="0"/>
-                        <a:t>PUT</a:t>
-                      </a:r>
-                    </a:p>
-                  </a:txBody>
-                  <a:tcPr/>
-                </a:tc>
-                <a:extLst>
-                  <a:ext uri="{0D108BD9-81ED-4DB2-BD59-A6C34878D82A}">
-                    <a16:rowId xmlns:a16="http://schemas.microsoft.com/office/drawing/2014/main" val="1664015319"/>
-                  </a:ext>
-                </a:extLst>
-              </a:tr>
-              <a:tr h="370840">
-                <a:tc>
-                  <a:txBody>
-                    <a:bodyPr/>
-                    <a:lstStyle/>
-                    <a:p>
-                      <a:pPr algn="l"/>
-                      <a:r>
-                        <a:rPr lang="en-US" b="1" dirty="0"/>
-                        <a:t>D</a:t>
-                      </a:r>
-                      <a:r>
-                        <a:rPr lang="en-US" dirty="0"/>
-                        <a:t>elete/Destroy</a:t>
-                      </a:r>
-                    </a:p>
-                  </a:txBody>
-                  <a:tcPr/>
-                </a:tc>
-                <a:tc>
-                  <a:txBody>
-                    <a:bodyPr/>
-                    <a:lstStyle/>
-                    <a:p>
-                      <a:pPr algn="l"/>
-                      <a:r>
-                        <a:rPr lang="en-US" dirty="0"/>
-                        <a:t>delete</a:t>
-                      </a:r>
-                    </a:p>
-                  </a:txBody>
-                  <a:tcPr/>
-                </a:tc>
-                <a:tc>
-                  <a:txBody>
-                    <a:bodyPr/>
-                    <a:lstStyle/>
-                    <a:p>
-                      <a:pPr algn="l"/>
-                      <a:r>
-                        <a:rPr lang="en-US" dirty="0"/>
-                        <a:t>remove</a:t>
-                      </a:r>
-                    </a:p>
-                  </a:txBody>
-                  <a:tcPr/>
-                </a:tc>
-                <a:tc>
-                  <a:txBody>
-                    <a:bodyPr/>
-                    <a:lstStyle/>
-                    <a:p>
-                      <a:pPr algn="l"/>
-                      <a:r>
-                        <a:rPr lang="en-US" dirty="0"/>
-                        <a:t>DELETE</a:t>
-                      </a:r>
-                    </a:p>
-                  </a:txBody>
-                  <a:tcPr/>
-                </a:tc>
-                <a:extLst>
-                  <a:ext uri="{0D108BD9-81ED-4DB2-BD59-A6C34878D82A}">
-                    <a16:rowId xmlns:a16="http://schemas.microsoft.com/office/drawing/2014/main" val="1353965540"/>
-                  </a:ext>
-                </a:extLst>
-              </a:tr>
-            </a:tbl>
-          </a:graphicData>
-        </a:graphic>
-      </p:graphicFrame>
-    </p:spTree>
-    <p:extLst>
-      <p:ext uri="{BB962C8B-B14F-4D97-AF65-F5344CB8AC3E}">
-        <p14:creationId xmlns:p14="http://schemas.microsoft.com/office/powerpoint/2010/main" val="2101029126"/>
-      </p:ext>
-    </p:extLst>
-  </p:cSld>
-  <p:clrMapOvr>
-    <a:masterClrMapping/>
-  </p:clrMapOvr>
-</p:sld>
-</file>
-
-<file path=ppt/slides/slide35.xml><?xml version="1.0" encoding="utf-8"?>
-<p:sld xmlns:a="http://schemas.openxmlformats.org/drawingml/2006/main" xmlns:r="http://schemas.openxmlformats.org/officeDocument/2006/relationships" xmlns:p="http://schemas.openxmlformats.org/presentationml/2006/main">
-  <p:cSld>
-    <p:spTree>
-      <p:nvGrpSpPr>
-        <p:cNvPr id="1" name=""/>
-        <p:cNvGrpSpPr/>
-        <p:nvPr/>
-      </p:nvGrpSpPr>
-      <p:grpSpPr>
-        <a:xfrm>
-          <a:off x="0" y="0"/>
-          <a:ext cx="0" cy="0"/>
-          <a:chOff x="0" y="0"/>
-          <a:chExt cx="0" cy="0"/>
-        </a:xfrm>
-      </p:grpSpPr>
-      <p:sp>
-        <p:nvSpPr>
-          <p:cNvPr id="2" name="Title 1">
-            <a:extLst>
-              <a:ext uri="{FF2B5EF4-FFF2-40B4-BE49-F238E27FC236}">
-                <a16:creationId xmlns:a16="http://schemas.microsoft.com/office/drawing/2014/main" id="{7BBC9961-4BF0-445F-9AD3-90DE00185188}"/>
-              </a:ext>
-            </a:extLst>
-          </p:cNvPr>
-          <p:cNvSpPr>
-            <a:spLocks noGrp="1"/>
-          </p:cNvSpPr>
-          <p:nvPr>
-            <p:ph type="title"/>
-          </p:nvPr>
-        </p:nvSpPr>
-        <p:spPr/>
-        <p:txBody>
-          <a:bodyPr/>
-          <a:lstStyle/>
-          <a:p>
-            <a:r>
-              <a:rPr lang="en-US"/>
-              <a:t>Using config to store the connection string</a:t>
-            </a:r>
-          </a:p>
-        </p:txBody>
-      </p:sp>
-      <p:sp>
-        <p:nvSpPr>
-          <p:cNvPr id="3" name="Content Placeholder 2">
-            <a:extLst>
-              <a:ext uri="{FF2B5EF4-FFF2-40B4-BE49-F238E27FC236}">
-                <a16:creationId xmlns:a16="http://schemas.microsoft.com/office/drawing/2014/main" id="{D04995EB-1AA3-43AF-A1AF-57A3BB47576F}"/>
-              </a:ext>
-            </a:extLst>
-          </p:cNvPr>
-          <p:cNvSpPr>
-            <a:spLocks noGrp="1"/>
-          </p:cNvSpPr>
-          <p:nvPr>
-            <p:ph idx="1"/>
-          </p:nvPr>
-        </p:nvSpPr>
-        <p:spPr/>
-        <p:txBody>
-          <a:bodyPr>
-            <a:normAutofit/>
-          </a:bodyPr>
-          <a:lstStyle/>
-          <a:p>
-            <a:endParaRPr lang="en-US" sz="2000"/>
-          </a:p>
-        </p:txBody>
-      </p:sp>
-    </p:spTree>
-    <p:extLst>
-      <p:ext uri="{BB962C8B-B14F-4D97-AF65-F5344CB8AC3E}">
-        <p14:creationId xmlns:p14="http://schemas.microsoft.com/office/powerpoint/2010/main" val="1449217856"/>
-      </p:ext>
-    </p:extLst>
-  </p:cSld>
-  <p:clrMapOvr>
-    <a:masterClrMapping/>
-  </p:clrMapOvr>
-</p:sld>
-</file>
-
-<file path=ppt/slides/slide36.xml><?xml version="1.0" encoding="utf-8"?>
-<p:sld xmlns:a="http://schemas.openxmlformats.org/drawingml/2006/main" xmlns:r="http://schemas.openxmlformats.org/officeDocument/2006/relationships" xmlns:p="http://schemas.openxmlformats.org/presentationml/2006/main">
-  <p:cSld>
-    <p:spTree>
-      <p:nvGrpSpPr>
-        <p:cNvPr id="1" name=""/>
-        <p:cNvGrpSpPr/>
-        <p:nvPr/>
-      </p:nvGrpSpPr>
-      <p:grpSpPr>
-        <a:xfrm>
-          <a:off x="0" y="0"/>
-          <a:ext cx="0" cy="0"/>
-          <a:chOff x="0" y="0"/>
-          <a:chExt cx="0" cy="0"/>
-        </a:xfrm>
-      </p:grpSpPr>
-      <p:sp>
-        <p:nvSpPr>
-          <p:cNvPr id="2" name="Title 1">
-            <a:extLst>
-              <a:ext uri="{FF2B5EF4-FFF2-40B4-BE49-F238E27FC236}">
-                <a16:creationId xmlns:a16="http://schemas.microsoft.com/office/drawing/2014/main" id="{7BBC9961-4BF0-445F-9AD3-90DE00185188}"/>
-              </a:ext>
-            </a:extLst>
-          </p:cNvPr>
-          <p:cNvSpPr>
-            <a:spLocks noGrp="1"/>
-          </p:cNvSpPr>
-          <p:nvPr>
-            <p:ph type="title"/>
-          </p:nvPr>
-        </p:nvSpPr>
-        <p:spPr/>
-        <p:txBody>
-          <a:bodyPr/>
-          <a:lstStyle/>
-          <a:p>
-            <a:r>
-              <a:rPr lang="en-US"/>
-              <a:t>Connecting to the database</a:t>
-            </a:r>
-          </a:p>
-        </p:txBody>
-      </p:sp>
-      <p:sp>
-        <p:nvSpPr>
-          <p:cNvPr id="3" name="Content Placeholder 2">
-            <a:extLst>
-              <a:ext uri="{FF2B5EF4-FFF2-40B4-BE49-F238E27FC236}">
-                <a16:creationId xmlns:a16="http://schemas.microsoft.com/office/drawing/2014/main" id="{D04995EB-1AA3-43AF-A1AF-57A3BB47576F}"/>
-              </a:ext>
-            </a:extLst>
-          </p:cNvPr>
-          <p:cNvSpPr>
-            <a:spLocks noGrp="1"/>
-          </p:cNvSpPr>
-          <p:nvPr>
-            <p:ph idx="1"/>
-          </p:nvPr>
-        </p:nvSpPr>
-        <p:spPr/>
-        <p:txBody>
-          <a:bodyPr>
-            <a:normAutofit/>
-          </a:bodyPr>
-          <a:lstStyle/>
-          <a:p>
-            <a:endParaRPr lang="en-US" sz="2000"/>
-          </a:p>
-        </p:txBody>
-      </p:sp>
-    </p:spTree>
-    <p:extLst>
-      <p:ext uri="{BB962C8B-B14F-4D97-AF65-F5344CB8AC3E}">
-        <p14:creationId xmlns:p14="http://schemas.microsoft.com/office/powerpoint/2010/main" val="4181882923"/>
-      </p:ext>
-    </p:extLst>
-  </p:cSld>
-  <p:clrMapOvr>
-    <a:masterClrMapping/>
-  </p:clrMapOvr>
-</p:sld>
-</file>
-
-<file path=ppt/slides/slide37.xml><?xml version="1.0" encoding="utf-8"?>
-<p:sld xmlns:a="http://schemas.openxmlformats.org/drawingml/2006/main" xmlns:r="http://schemas.openxmlformats.org/officeDocument/2006/relationships" xmlns:p="http://schemas.openxmlformats.org/presentationml/2006/main">
-  <p:cSld>
-    <p:spTree>
-      <p:nvGrpSpPr>
-        <p:cNvPr id="1" name=""/>
-        <p:cNvGrpSpPr/>
-        <p:nvPr/>
-      </p:nvGrpSpPr>
-      <p:grpSpPr>
-        <a:xfrm>
-          <a:off x="0" y="0"/>
-          <a:ext cx="0" cy="0"/>
-          <a:chOff x="0" y="0"/>
-          <a:chExt cx="0" cy="0"/>
-        </a:xfrm>
-      </p:grpSpPr>
-      <p:sp>
-        <p:nvSpPr>
-          <p:cNvPr id="2" name="Title 1">
-            <a:extLst>
-              <a:ext uri="{FF2B5EF4-FFF2-40B4-BE49-F238E27FC236}">
-                <a16:creationId xmlns:a16="http://schemas.microsoft.com/office/drawing/2014/main" id="{7BBC9961-4BF0-445F-9AD3-90DE00185188}"/>
-              </a:ext>
-            </a:extLst>
-          </p:cNvPr>
-          <p:cNvSpPr>
-            <a:spLocks noGrp="1"/>
-          </p:cNvSpPr>
-          <p:nvPr>
-            <p:ph type="title"/>
-          </p:nvPr>
-        </p:nvSpPr>
-        <p:spPr/>
-        <p:txBody>
-          <a:bodyPr/>
-          <a:lstStyle/>
-          <a:p>
-            <a:r>
-              <a:rPr lang="en-US"/>
-              <a:t>Example: Getting all documents in a collection</a:t>
-            </a:r>
-          </a:p>
-        </p:txBody>
-      </p:sp>
-      <p:sp>
-        <p:nvSpPr>
-          <p:cNvPr id="3" name="Content Placeholder 2">
-            <a:extLst>
-              <a:ext uri="{FF2B5EF4-FFF2-40B4-BE49-F238E27FC236}">
-                <a16:creationId xmlns:a16="http://schemas.microsoft.com/office/drawing/2014/main" id="{D04995EB-1AA3-43AF-A1AF-57A3BB47576F}"/>
-              </a:ext>
-            </a:extLst>
-          </p:cNvPr>
-          <p:cNvSpPr>
-            <a:spLocks noGrp="1"/>
-          </p:cNvSpPr>
-          <p:nvPr>
-            <p:ph idx="1"/>
-          </p:nvPr>
-        </p:nvSpPr>
-        <p:spPr/>
-        <p:txBody>
-          <a:bodyPr>
-            <a:normAutofit/>
-          </a:bodyPr>
-          <a:lstStyle/>
-          <a:p>
-            <a:endParaRPr lang="en-US" sz="2000"/>
-          </a:p>
-        </p:txBody>
-      </p:sp>
-    </p:spTree>
-    <p:extLst>
-      <p:ext uri="{BB962C8B-B14F-4D97-AF65-F5344CB8AC3E}">
-        <p14:creationId xmlns:p14="http://schemas.microsoft.com/office/powerpoint/2010/main" val="2305014259"/>
-      </p:ext>
-    </p:extLst>
-  </p:cSld>
-  <p:clrMapOvr>
-    <a:masterClrMapping/>
-  </p:clrMapOvr>
-</p:sld>
-</file>
-
-<file path=ppt/slides/slide38.xml><?xml version="1.0" encoding="utf-8"?>
-<p:sld xmlns:a="http://schemas.openxmlformats.org/drawingml/2006/main" xmlns:r="http://schemas.openxmlformats.org/officeDocument/2006/relationships" xmlns:p="http://schemas.openxmlformats.org/presentationml/2006/main">
-  <p:cSld>
-    <p:spTree>
-      <p:nvGrpSpPr>
-        <p:cNvPr id="1" name=""/>
-        <p:cNvGrpSpPr/>
-        <p:nvPr/>
-      </p:nvGrpSpPr>
-      <p:grpSpPr>
-        <a:xfrm>
-          <a:off x="0" y="0"/>
-          <a:ext cx="0" cy="0"/>
-          <a:chOff x="0" y="0"/>
-          <a:chExt cx="0" cy="0"/>
-        </a:xfrm>
-      </p:grpSpPr>
-      <p:sp>
-        <p:nvSpPr>
-          <p:cNvPr id="2" name="Title 1">
-            <a:extLst>
-              <a:ext uri="{FF2B5EF4-FFF2-40B4-BE49-F238E27FC236}">
-                <a16:creationId xmlns:a16="http://schemas.microsoft.com/office/drawing/2014/main" id="{7BBC9961-4BF0-445F-9AD3-90DE00185188}"/>
-              </a:ext>
-            </a:extLst>
-          </p:cNvPr>
-          <p:cNvSpPr>
-            <a:spLocks noGrp="1"/>
-          </p:cNvSpPr>
-          <p:nvPr>
-            <p:ph type="title"/>
-          </p:nvPr>
-        </p:nvSpPr>
-        <p:spPr/>
-        <p:txBody>
-          <a:bodyPr/>
-          <a:lstStyle/>
-          <a:p>
-            <a:r>
-              <a:rPr lang="en-US"/>
-              <a:t>Example: Getting some documents from a collection</a:t>
-            </a:r>
-          </a:p>
-        </p:txBody>
-      </p:sp>
-      <p:sp>
-        <p:nvSpPr>
-          <p:cNvPr id="3" name="Content Placeholder 2">
-            <a:extLst>
-              <a:ext uri="{FF2B5EF4-FFF2-40B4-BE49-F238E27FC236}">
-                <a16:creationId xmlns:a16="http://schemas.microsoft.com/office/drawing/2014/main" id="{D04995EB-1AA3-43AF-A1AF-57A3BB47576F}"/>
-              </a:ext>
-            </a:extLst>
-          </p:cNvPr>
-          <p:cNvSpPr>
-            <a:spLocks noGrp="1"/>
-          </p:cNvSpPr>
-          <p:nvPr>
-            <p:ph idx="1"/>
-          </p:nvPr>
-        </p:nvSpPr>
-        <p:spPr/>
-        <p:txBody>
-          <a:bodyPr>
-            <a:normAutofit/>
-          </a:bodyPr>
-          <a:lstStyle/>
-          <a:p>
-            <a:endParaRPr lang="en-US" sz="2000"/>
-          </a:p>
-        </p:txBody>
-      </p:sp>
-    </p:spTree>
-    <p:extLst>
-      <p:ext uri="{BB962C8B-B14F-4D97-AF65-F5344CB8AC3E}">
-        <p14:creationId xmlns:p14="http://schemas.microsoft.com/office/powerpoint/2010/main" val="3432616808"/>
-      </p:ext>
-    </p:extLst>
-  </p:cSld>
-  <p:clrMapOvr>
-    <a:masterClrMapping/>
-  </p:clrMapOvr>
-</p:sld>
-</file>
-
-<file path=ppt/slides/slide39.xml><?xml version="1.0" encoding="utf-8"?>
-<p:sld xmlns:a="http://schemas.openxmlformats.org/drawingml/2006/main" xmlns:r="http://schemas.openxmlformats.org/officeDocument/2006/relationships" xmlns:p="http://schemas.openxmlformats.org/presentationml/2006/main">
-  <p:cSld>
-    <p:spTree>
-      <p:nvGrpSpPr>
-        <p:cNvPr id="1" name=""/>
-        <p:cNvGrpSpPr/>
-        <p:nvPr/>
-      </p:nvGrpSpPr>
-      <p:grpSpPr>
-        <a:xfrm>
-          <a:off x="0" y="0"/>
-          <a:ext cx="0" cy="0"/>
-          <a:chOff x="0" y="0"/>
-          <a:chExt cx="0" cy="0"/>
-        </a:xfrm>
-      </p:grpSpPr>
-      <p:sp>
-        <p:nvSpPr>
-          <p:cNvPr id="2" name="Title 1">
-            <a:extLst>
-              <a:ext uri="{FF2B5EF4-FFF2-40B4-BE49-F238E27FC236}">
-                <a16:creationId xmlns:a16="http://schemas.microsoft.com/office/drawing/2014/main" id="{7BBC9961-4BF0-445F-9AD3-90DE00185188}"/>
-              </a:ext>
-            </a:extLst>
-          </p:cNvPr>
-          <p:cNvSpPr>
-            <a:spLocks noGrp="1"/>
-          </p:cNvSpPr>
-          <p:nvPr>
-            <p:ph type="title"/>
-          </p:nvPr>
-        </p:nvSpPr>
-        <p:spPr/>
-        <p:txBody>
-          <a:bodyPr/>
-          <a:lstStyle/>
-          <a:p>
-            <a:r>
-              <a:rPr lang="en-US"/>
-              <a:t>Example: Getting one document from a collection</a:t>
-            </a:r>
-          </a:p>
-        </p:txBody>
-      </p:sp>
-      <p:sp>
-        <p:nvSpPr>
-          <p:cNvPr id="3" name="Content Placeholder 2">
-            <a:extLst>
-              <a:ext uri="{FF2B5EF4-FFF2-40B4-BE49-F238E27FC236}">
-                <a16:creationId xmlns:a16="http://schemas.microsoft.com/office/drawing/2014/main" id="{D04995EB-1AA3-43AF-A1AF-57A3BB47576F}"/>
-              </a:ext>
-            </a:extLst>
-          </p:cNvPr>
-          <p:cNvSpPr>
-            <a:spLocks noGrp="1"/>
-          </p:cNvSpPr>
-          <p:nvPr>
-            <p:ph idx="1"/>
-          </p:nvPr>
-        </p:nvSpPr>
-        <p:spPr/>
-        <p:txBody>
-          <a:bodyPr>
-            <a:normAutofit/>
-          </a:bodyPr>
-          <a:lstStyle/>
-          <a:p>
-            <a:endParaRPr lang="en-US" sz="2000"/>
-          </a:p>
-        </p:txBody>
-      </p:sp>
-    </p:spTree>
-    <p:extLst>
-      <p:ext uri="{BB962C8B-B14F-4D97-AF65-F5344CB8AC3E}">
-        <p14:creationId xmlns:p14="http://schemas.microsoft.com/office/powerpoint/2010/main" val="3266463990"/>
-      </p:ext>
-    </p:extLst>
-  </p:cSld>
-  <p:clrMapOvr>
-    <a:masterClrMapping/>
-  </p:clrMapOvr>
-</p:sld>
-</file>
-
-<file path=ppt/slides/slide4.xml><?xml version="1.0" encoding="utf-8"?>
-<p:sld xmlns:a="http://schemas.openxmlformats.org/drawingml/2006/main" xmlns:r="http://schemas.openxmlformats.org/officeDocument/2006/relationships" xmlns:p="http://schemas.openxmlformats.org/presentationml/2006/main">
-  <p:cSld>
-    <p:spTree>
-      <p:nvGrpSpPr>
-        <p:cNvPr id="1" name=""/>
-        <p:cNvGrpSpPr/>
-        <p:nvPr/>
-      </p:nvGrpSpPr>
-      <p:grpSpPr>
-        <a:xfrm>
-          <a:off x="0" y="0"/>
-          <a:ext cx="0" cy="0"/>
-          <a:chOff x="0" y="0"/>
-          <a:chExt cx="0" cy="0"/>
-        </a:xfrm>
-      </p:grpSpPr>
-      <p:sp>
-        <p:nvSpPr>
-          <p:cNvPr id="2" name="Title 1">
-            <a:extLst>
-              <a:ext uri="{FF2B5EF4-FFF2-40B4-BE49-F238E27FC236}">
-                <a16:creationId xmlns:a16="http://schemas.microsoft.com/office/drawing/2014/main" id="{E214FDAA-3475-4E7F-8A6C-EE14BDAF06FB}"/>
-              </a:ext>
-            </a:extLst>
-          </p:cNvPr>
-          <p:cNvSpPr>
-            <a:spLocks noGrp="1"/>
-          </p:cNvSpPr>
-          <p:nvPr>
-            <p:ph type="title"/>
-          </p:nvPr>
-        </p:nvSpPr>
-        <p:spPr/>
-        <p:txBody>
-          <a:bodyPr/>
-          <a:lstStyle/>
-          <a:p>
-            <a:r>
-              <a:rPr lang="en-US" dirty="0"/>
-              <a:t>What is a Relational Database?</a:t>
-            </a:r>
-          </a:p>
-        </p:txBody>
-      </p:sp>
-      <p:sp>
-        <p:nvSpPr>
-          <p:cNvPr id="3" name="Content Placeholder 2">
-            <a:extLst>
-              <a:ext uri="{FF2B5EF4-FFF2-40B4-BE49-F238E27FC236}">
-                <a16:creationId xmlns:a16="http://schemas.microsoft.com/office/drawing/2014/main" id="{66970AE5-E5D1-489E-8A8D-0A3ABF694FE5}"/>
-              </a:ext>
-            </a:extLst>
-          </p:cNvPr>
-          <p:cNvSpPr>
-            <a:spLocks noGrp="1"/>
-          </p:cNvSpPr>
-          <p:nvPr>
-            <p:ph idx="1"/>
-          </p:nvPr>
-        </p:nvSpPr>
-        <p:spPr>
-          <a:xfrm>
-            <a:off x="1066800" y="2103120"/>
-            <a:ext cx="10058400" cy="4754880"/>
-          </a:xfrm>
-        </p:spPr>
-        <p:txBody>
-          <a:bodyPr>
-            <a:normAutofit/>
-          </a:bodyPr>
-          <a:lstStyle/>
-          <a:p>
-            <a:r>
-              <a:rPr lang="en-US" sz="1800" dirty="0"/>
-              <a:t>Key components: schemas, tables, columns,  rows, cells, relationships</a:t>
-            </a:r>
-          </a:p>
-          <a:p>
-            <a:r>
-              <a:rPr lang="en-US" sz="1800" dirty="0"/>
-              <a:t>Designed to optimize sequential reads and writes.</a:t>
-            </a:r>
-          </a:p>
-          <a:p>
-            <a:r>
-              <a:rPr lang="en-US" sz="1800" dirty="0"/>
-              <a:t>Designed to facilatate random access by giving rows a fixed size in bytes.</a:t>
-            </a:r>
-          </a:p>
-          <a:p>
-            <a:r>
-              <a:rPr lang="en-US" sz="1800" dirty="0"/>
-              <a:t>Designed around the limitations of magnetic disk drives.</a:t>
-            </a:r>
-          </a:p>
-          <a:p>
-            <a:r>
-              <a:rPr lang="en-US" sz="1800" dirty="0"/>
-              <a:t>Designed to strictly enforce data types, relationships, and other constraints.</a:t>
-            </a:r>
-          </a:p>
-          <a:p>
-            <a:pPr marL="0" indent="0">
-              <a:buNone/>
-            </a:pPr>
-            <a:endParaRPr lang="en-US" sz="1800" dirty="0"/>
-          </a:p>
-          <a:p>
-            <a:pPr marL="0" indent="0">
-              <a:buNone/>
-            </a:pPr>
-            <a:r>
-              <a:rPr lang="en-US" sz="1800" b="1" dirty="0"/>
-              <a:t>Sources</a:t>
-            </a:r>
-          </a:p>
-          <a:p>
-            <a:pPr marL="0" indent="0">
-              <a:buNone/>
-            </a:pPr>
-            <a:r>
-              <a:rPr lang="en-US" sz="1800" dirty="0">
-                <a:hlinkClick r:id="rId2"/>
-              </a:rPr>
-              <a:t>https://www.mongodb.com/nosql-explained</a:t>
-            </a:r>
-            <a:endParaRPr lang="en-US" sz="1800" dirty="0">
-              <a:hlinkClick r:id="rId3"/>
-            </a:endParaRPr>
-          </a:p>
-          <a:p>
-            <a:pPr marL="0" indent="0">
-              <a:buNone/>
-            </a:pPr>
-            <a:r>
-              <a:rPr lang="en-US" sz="1800" dirty="0">
-                <a:hlinkClick r:id="rId3"/>
-              </a:rPr>
-              <a:t>https://en.wikipedia.org/wiki/relational_database</a:t>
-            </a:r>
-            <a:endParaRPr lang="en-US" sz="1800" dirty="0"/>
-          </a:p>
-          <a:p>
-            <a:pPr marL="0" indent="0">
-              <a:buNone/>
-            </a:pPr>
-            <a:r>
-              <a:rPr lang="en-US" sz="1800" dirty="0">
-                <a:hlinkClick r:id="rId4"/>
-              </a:rPr>
-              <a:t>https://en.wikipedia.org/wiki/sql</a:t>
-            </a:r>
-            <a:endParaRPr lang="en-US" sz="1800" dirty="0"/>
-          </a:p>
-        </p:txBody>
-      </p:sp>
-    </p:spTree>
-    <p:extLst>
-      <p:ext uri="{BB962C8B-B14F-4D97-AF65-F5344CB8AC3E}">
-        <p14:creationId xmlns:p14="http://schemas.microsoft.com/office/powerpoint/2010/main" val="3550088433"/>
-      </p:ext>
-    </p:extLst>
-  </p:cSld>
-  <p:clrMapOvr>
-    <a:masterClrMapping/>
-  </p:clrMapOvr>
-</p:sld>
-</file>
-
-<file path=ppt/slides/slide40.xml><?xml version="1.0" encoding="utf-8"?>
-<p:sld xmlns:a="http://schemas.openxmlformats.org/drawingml/2006/main" xmlns:r="http://schemas.openxmlformats.org/officeDocument/2006/relationships" xmlns:p="http://schemas.openxmlformats.org/presentationml/2006/main">
-  <p:cSld>
-    <p:spTree>
-      <p:nvGrpSpPr>
-        <p:cNvPr id="1" name=""/>
-        <p:cNvGrpSpPr/>
-        <p:nvPr/>
-      </p:nvGrpSpPr>
-      <p:grpSpPr>
-        <a:xfrm>
-          <a:off x="0" y="0"/>
-          <a:ext cx="0" cy="0"/>
-          <a:chOff x="0" y="0"/>
-          <a:chExt cx="0" cy="0"/>
-        </a:xfrm>
-      </p:grpSpPr>
-      <p:sp>
-        <p:nvSpPr>
-          <p:cNvPr id="2" name="Title 1">
-            <a:extLst>
-              <a:ext uri="{FF2B5EF4-FFF2-40B4-BE49-F238E27FC236}">
-                <a16:creationId xmlns:a16="http://schemas.microsoft.com/office/drawing/2014/main" id="{7BBC9961-4BF0-445F-9AD3-90DE00185188}"/>
-              </a:ext>
-            </a:extLst>
-          </p:cNvPr>
-          <p:cNvSpPr>
-            <a:spLocks noGrp="1"/>
-          </p:cNvSpPr>
-          <p:nvPr>
-            <p:ph type="title"/>
-          </p:nvPr>
-        </p:nvSpPr>
-        <p:spPr/>
-        <p:txBody>
-          <a:bodyPr/>
-          <a:lstStyle/>
-          <a:p>
-            <a:r>
-              <a:rPr lang="en-US"/>
-              <a:t>Example: Inserting Documents</a:t>
-            </a:r>
-          </a:p>
-        </p:txBody>
-      </p:sp>
-      <p:sp>
-        <p:nvSpPr>
-          <p:cNvPr id="3" name="Content Placeholder 2">
-            <a:extLst>
-              <a:ext uri="{FF2B5EF4-FFF2-40B4-BE49-F238E27FC236}">
-                <a16:creationId xmlns:a16="http://schemas.microsoft.com/office/drawing/2014/main" id="{D04995EB-1AA3-43AF-A1AF-57A3BB47576F}"/>
-              </a:ext>
-            </a:extLst>
-          </p:cNvPr>
-          <p:cNvSpPr>
-            <a:spLocks noGrp="1"/>
-          </p:cNvSpPr>
-          <p:nvPr>
-            <p:ph idx="1"/>
-          </p:nvPr>
-        </p:nvSpPr>
-        <p:spPr/>
-        <p:txBody>
-          <a:bodyPr>
-            <a:normAutofit/>
-          </a:bodyPr>
-          <a:lstStyle/>
-          <a:p>
-            <a:endParaRPr lang="en-US" sz="2000"/>
-          </a:p>
-        </p:txBody>
-      </p:sp>
-    </p:spTree>
-    <p:extLst>
-      <p:ext uri="{BB962C8B-B14F-4D97-AF65-F5344CB8AC3E}">
-        <p14:creationId xmlns:p14="http://schemas.microsoft.com/office/powerpoint/2010/main" val="2229891312"/>
-      </p:ext>
-    </p:extLst>
-  </p:cSld>
-  <p:clrMapOvr>
-    <a:masterClrMapping/>
-  </p:clrMapOvr>
-</p:sld>
-</file>
-
-<file path=ppt/slides/slide41.xml><?xml version="1.0" encoding="utf-8"?>
-<p:sld xmlns:a="http://schemas.openxmlformats.org/drawingml/2006/main" xmlns:r="http://schemas.openxmlformats.org/officeDocument/2006/relationships" xmlns:p="http://schemas.openxmlformats.org/presentationml/2006/main">
-  <p:cSld>
-    <p:spTree>
-      <p:nvGrpSpPr>
-        <p:cNvPr id="1" name=""/>
-        <p:cNvGrpSpPr/>
-        <p:nvPr/>
-      </p:nvGrpSpPr>
-      <p:grpSpPr>
-        <a:xfrm>
-          <a:off x="0" y="0"/>
-          <a:ext cx="0" cy="0"/>
-          <a:chOff x="0" y="0"/>
-          <a:chExt cx="0" cy="0"/>
-        </a:xfrm>
-      </p:grpSpPr>
-      <p:sp>
-        <p:nvSpPr>
-          <p:cNvPr id="2" name="Title 1">
-            <a:extLst>
-              <a:ext uri="{FF2B5EF4-FFF2-40B4-BE49-F238E27FC236}">
-                <a16:creationId xmlns:a16="http://schemas.microsoft.com/office/drawing/2014/main" id="{7BBC9961-4BF0-445F-9AD3-90DE00185188}"/>
-              </a:ext>
-            </a:extLst>
-          </p:cNvPr>
-          <p:cNvSpPr>
-            <a:spLocks noGrp="1"/>
-          </p:cNvSpPr>
-          <p:nvPr>
-            <p:ph type="title"/>
-          </p:nvPr>
-        </p:nvSpPr>
-        <p:spPr/>
-        <p:txBody>
-          <a:bodyPr/>
-          <a:lstStyle/>
-          <a:p>
-            <a:r>
-              <a:rPr lang="en-US"/>
-              <a:t>Example: Updating Documents</a:t>
-            </a:r>
-          </a:p>
-        </p:txBody>
-      </p:sp>
-      <p:sp>
-        <p:nvSpPr>
-          <p:cNvPr id="3" name="Content Placeholder 2">
-            <a:extLst>
-              <a:ext uri="{FF2B5EF4-FFF2-40B4-BE49-F238E27FC236}">
-                <a16:creationId xmlns:a16="http://schemas.microsoft.com/office/drawing/2014/main" id="{D04995EB-1AA3-43AF-A1AF-57A3BB47576F}"/>
-              </a:ext>
-            </a:extLst>
-          </p:cNvPr>
-          <p:cNvSpPr>
-            <a:spLocks noGrp="1"/>
-          </p:cNvSpPr>
-          <p:nvPr>
-            <p:ph idx="1"/>
-          </p:nvPr>
-        </p:nvSpPr>
-        <p:spPr/>
-        <p:txBody>
-          <a:bodyPr>
-            <a:normAutofit/>
-          </a:bodyPr>
-          <a:lstStyle/>
-          <a:p>
-            <a:endParaRPr lang="en-US" sz="2000"/>
-          </a:p>
-        </p:txBody>
-      </p:sp>
-    </p:spTree>
-    <p:extLst>
-      <p:ext uri="{BB962C8B-B14F-4D97-AF65-F5344CB8AC3E}">
-        <p14:creationId xmlns:p14="http://schemas.microsoft.com/office/powerpoint/2010/main" val="2405577913"/>
-      </p:ext>
-    </p:extLst>
-  </p:cSld>
-  <p:clrMapOvr>
-    <a:masterClrMapping/>
-  </p:clrMapOvr>
-</p:sld>
-</file>
-
-<file path=ppt/slides/slide42.xml><?xml version="1.0" encoding="utf-8"?>
-<p:sld xmlns:a="http://schemas.openxmlformats.org/drawingml/2006/main" xmlns:r="http://schemas.openxmlformats.org/officeDocument/2006/relationships" xmlns:p="http://schemas.openxmlformats.org/presentationml/2006/main">
-  <p:cSld>
-    <p:spTree>
-      <p:nvGrpSpPr>
-        <p:cNvPr id="1" name=""/>
-        <p:cNvGrpSpPr/>
-        <p:nvPr/>
-      </p:nvGrpSpPr>
-      <p:grpSpPr>
-        <a:xfrm>
-          <a:off x="0" y="0"/>
-          <a:ext cx="0" cy="0"/>
-          <a:chOff x="0" y="0"/>
-          <a:chExt cx="0" cy="0"/>
-        </a:xfrm>
-      </p:grpSpPr>
-      <p:sp>
-        <p:nvSpPr>
-          <p:cNvPr id="2" name="Title 1">
-            <a:extLst>
-              <a:ext uri="{FF2B5EF4-FFF2-40B4-BE49-F238E27FC236}">
-                <a16:creationId xmlns:a16="http://schemas.microsoft.com/office/drawing/2014/main" id="{7BBC9961-4BF0-445F-9AD3-90DE00185188}"/>
-              </a:ext>
-            </a:extLst>
-          </p:cNvPr>
-          <p:cNvSpPr>
-            <a:spLocks noGrp="1"/>
-          </p:cNvSpPr>
-          <p:nvPr>
-            <p:ph type="title"/>
-          </p:nvPr>
-        </p:nvSpPr>
-        <p:spPr/>
-        <p:txBody>
-          <a:bodyPr/>
-          <a:lstStyle/>
-          <a:p>
-            <a:r>
-              <a:rPr lang="en-US"/>
-              <a:t>Example: Upsert</a:t>
-            </a:r>
-          </a:p>
-        </p:txBody>
-      </p:sp>
-      <p:sp>
-        <p:nvSpPr>
-          <p:cNvPr id="3" name="Content Placeholder 2">
-            <a:extLst>
-              <a:ext uri="{FF2B5EF4-FFF2-40B4-BE49-F238E27FC236}">
-                <a16:creationId xmlns:a16="http://schemas.microsoft.com/office/drawing/2014/main" id="{D04995EB-1AA3-43AF-A1AF-57A3BB47576F}"/>
-              </a:ext>
-            </a:extLst>
-          </p:cNvPr>
-          <p:cNvSpPr>
-            <a:spLocks noGrp="1"/>
-          </p:cNvSpPr>
-          <p:nvPr>
-            <p:ph idx="1"/>
-          </p:nvPr>
-        </p:nvSpPr>
-        <p:spPr/>
-        <p:txBody>
-          <a:bodyPr>
-            <a:normAutofit/>
-          </a:bodyPr>
-          <a:lstStyle/>
-          <a:p>
-            <a:endParaRPr lang="en-US" sz="2000"/>
-          </a:p>
-        </p:txBody>
-      </p:sp>
-    </p:spTree>
-    <p:extLst>
-      <p:ext uri="{BB962C8B-B14F-4D97-AF65-F5344CB8AC3E}">
-        <p14:creationId xmlns:p14="http://schemas.microsoft.com/office/powerpoint/2010/main" val="3419159743"/>
-      </p:ext>
-    </p:extLst>
-  </p:cSld>
-  <p:clrMapOvr>
-    <a:masterClrMapping/>
-  </p:clrMapOvr>
-</p:sld>
-</file>
-
-<file path=ppt/slides/slide43.xml><?xml version="1.0" encoding="utf-8"?>
-<p:sld xmlns:a="http://schemas.openxmlformats.org/drawingml/2006/main" xmlns:r="http://schemas.openxmlformats.org/officeDocument/2006/relationships" xmlns:p="http://schemas.openxmlformats.org/presentationml/2006/main">
-  <p:cSld>
-    <p:spTree>
-      <p:nvGrpSpPr>
-        <p:cNvPr id="1" name=""/>
-        <p:cNvGrpSpPr/>
-        <p:nvPr/>
-      </p:nvGrpSpPr>
-      <p:grpSpPr>
-        <a:xfrm>
-          <a:off x="0" y="0"/>
-          <a:ext cx="0" cy="0"/>
-          <a:chOff x="0" y="0"/>
-          <a:chExt cx="0" cy="0"/>
-        </a:xfrm>
-      </p:grpSpPr>
-      <p:sp>
-        <p:nvSpPr>
-          <p:cNvPr id="2" name="Title 1">
-            <a:extLst>
-              <a:ext uri="{FF2B5EF4-FFF2-40B4-BE49-F238E27FC236}">
-                <a16:creationId xmlns:a16="http://schemas.microsoft.com/office/drawing/2014/main" id="{7BBC9961-4BF0-445F-9AD3-90DE00185188}"/>
-              </a:ext>
-            </a:extLst>
-          </p:cNvPr>
-          <p:cNvSpPr>
-            <a:spLocks noGrp="1"/>
-          </p:cNvSpPr>
-          <p:nvPr>
-            <p:ph type="title"/>
-          </p:nvPr>
-        </p:nvSpPr>
-        <p:spPr/>
-        <p:txBody>
-          <a:bodyPr/>
-          <a:lstStyle/>
-          <a:p>
-            <a:r>
-              <a:rPr lang="en-US"/>
-              <a:t>Example: Deleting Documents</a:t>
-            </a:r>
-          </a:p>
-        </p:txBody>
-      </p:sp>
-      <p:sp>
-        <p:nvSpPr>
-          <p:cNvPr id="3" name="Content Placeholder 2">
-            <a:extLst>
-              <a:ext uri="{FF2B5EF4-FFF2-40B4-BE49-F238E27FC236}">
-                <a16:creationId xmlns:a16="http://schemas.microsoft.com/office/drawing/2014/main" id="{D04995EB-1AA3-43AF-A1AF-57A3BB47576F}"/>
-              </a:ext>
-            </a:extLst>
-          </p:cNvPr>
-          <p:cNvSpPr>
-            <a:spLocks noGrp="1"/>
-          </p:cNvSpPr>
-          <p:nvPr>
-            <p:ph idx="1"/>
-          </p:nvPr>
-        </p:nvSpPr>
-        <p:spPr/>
-        <p:txBody>
-          <a:bodyPr>
-            <a:normAutofit/>
-          </a:bodyPr>
-          <a:lstStyle/>
-          <a:p>
-            <a:endParaRPr lang="en-US" sz="2000"/>
-          </a:p>
-        </p:txBody>
-      </p:sp>
-    </p:spTree>
-    <p:extLst>
-      <p:ext uri="{BB962C8B-B14F-4D97-AF65-F5344CB8AC3E}">
-        <p14:creationId xmlns:p14="http://schemas.microsoft.com/office/powerpoint/2010/main" val="2419962055"/>
-      </p:ext>
-    </p:extLst>
-  </p:cSld>
-  <p:clrMapOvr>
-    <a:masterClrMapping/>
-  </p:clrMapOvr>
-</p:sld>
-</file>
-
-<file path=ppt/slides/slide44.xml><?xml version="1.0" encoding="utf-8"?>
-<p:sld xmlns:a="http://schemas.openxmlformats.org/drawingml/2006/main" xmlns:r="http://schemas.openxmlformats.org/officeDocument/2006/relationships" xmlns:p="http://schemas.openxmlformats.org/presentationml/2006/main">
-  <p:cSld>
-    <p:bg>
-      <p:bgPr>
-        <a:solidFill>
-          <a:schemeClr val="bg1"/>
-        </a:solidFill>
-        <a:effectLst/>
-      </p:bgPr>
-    </p:bg>
-    <p:spTree>
-      <p:nvGrpSpPr>
-        <p:cNvPr id="1" name=""/>
-        <p:cNvGrpSpPr/>
-        <p:nvPr/>
-      </p:nvGrpSpPr>
-      <p:grpSpPr>
-        <a:xfrm>
-          <a:off x="0" y="0"/>
-          <a:ext cx="0" cy="0"/>
-          <a:chOff x="0" y="0"/>
-          <a:chExt cx="0" cy="0"/>
-        </a:xfrm>
-      </p:grpSpPr>
-      <p:sp>
-        <p:nvSpPr>
           <p:cNvPr id="9" name="Rectangle 8">
             <a:extLst>
               <a:ext uri="{FF2B5EF4-FFF2-40B4-BE49-F238E27FC236}">
@@ -16065,7 +13774,7 @@
 </p:sld>
 </file>
 
-<file path=ppt/slides/slide45.xml><?xml version="1.0" encoding="utf-8"?>
+<file path=ppt/slides/slide34.xml><?xml version="1.0" encoding="utf-8"?>
 <p:sld xmlns:a="http://schemas.openxmlformats.org/drawingml/2006/main" xmlns:r="http://schemas.openxmlformats.org/officeDocument/2006/relationships" xmlns:p="http://schemas.openxmlformats.org/presentationml/2006/main">
   <p:cSld>
     <p:spTree>
@@ -16128,10 +13837,12 @@
         </p:nvSpPr>
         <p:spPr/>
         <p:txBody>
-          <a:bodyPr/>
+          <a:bodyPr>
+            <a:normAutofit/>
+          </a:bodyPr>
           <a:lstStyle/>
           <a:p>
-            <a:endParaRPr lang="en-US" dirty="0"/>
+            <a:endParaRPr lang="en-US" sz="1800" dirty="0"/>
           </a:p>
         </p:txBody>
       </p:sp>
@@ -16139,6 +13850,176 @@
     <p:extLst>
       <p:ext uri="{BB962C8B-B14F-4D97-AF65-F5344CB8AC3E}">
         <p14:creationId xmlns:p14="http://schemas.microsoft.com/office/powerpoint/2010/main" val="923578432"/>
+      </p:ext>
+    </p:extLst>
+  </p:cSld>
+  <p:clrMapOvr>
+    <a:masterClrMapping/>
+  </p:clrMapOvr>
+</p:sld>
+</file>
+
+<file path=ppt/slides/slide4.xml><?xml version="1.0" encoding="utf-8"?>
+<p:sld xmlns:a="http://schemas.openxmlformats.org/drawingml/2006/main" xmlns:r="http://schemas.openxmlformats.org/officeDocument/2006/relationships" xmlns:p="http://schemas.openxmlformats.org/presentationml/2006/main">
+  <p:cSld>
+    <p:spTree>
+      <p:nvGrpSpPr>
+        <p:cNvPr id="1" name=""/>
+        <p:cNvGrpSpPr/>
+        <p:nvPr/>
+      </p:nvGrpSpPr>
+      <p:grpSpPr>
+        <a:xfrm>
+          <a:off x="0" y="0"/>
+          <a:ext cx="0" cy="0"/>
+          <a:chOff x="0" y="0"/>
+          <a:chExt cx="0" cy="0"/>
+        </a:xfrm>
+      </p:grpSpPr>
+      <p:sp>
+        <p:nvSpPr>
+          <p:cNvPr id="2" name="Title 1">
+            <a:extLst>
+              <a:ext uri="{FF2B5EF4-FFF2-40B4-BE49-F238E27FC236}">
+                <a16:creationId xmlns:a16="http://schemas.microsoft.com/office/drawing/2014/main" id="{E214FDAA-3475-4E7F-8A6C-EE14BDAF06FB}"/>
+              </a:ext>
+            </a:extLst>
+          </p:cNvPr>
+          <p:cNvSpPr>
+            <a:spLocks noGrp="1"/>
+          </p:cNvSpPr>
+          <p:nvPr>
+            <p:ph type="title"/>
+          </p:nvPr>
+        </p:nvSpPr>
+        <p:spPr/>
+        <p:txBody>
+          <a:bodyPr/>
+          <a:lstStyle/>
+          <a:p>
+            <a:r>
+              <a:rPr lang="en-US" dirty="0"/>
+              <a:t>What is a Relational Database?</a:t>
+            </a:r>
+          </a:p>
+        </p:txBody>
+      </p:sp>
+      <p:sp>
+        <p:nvSpPr>
+          <p:cNvPr id="3" name="Content Placeholder 2">
+            <a:extLst>
+              <a:ext uri="{FF2B5EF4-FFF2-40B4-BE49-F238E27FC236}">
+                <a16:creationId xmlns:a16="http://schemas.microsoft.com/office/drawing/2014/main" id="{66970AE5-E5D1-489E-8A8D-0A3ABF694FE5}"/>
+              </a:ext>
+            </a:extLst>
+          </p:cNvPr>
+          <p:cNvSpPr>
+            <a:spLocks noGrp="1"/>
+          </p:cNvSpPr>
+          <p:nvPr>
+            <p:ph idx="1"/>
+          </p:nvPr>
+        </p:nvSpPr>
+        <p:spPr>
+          <a:xfrm>
+            <a:off x="1066800" y="2103120"/>
+            <a:ext cx="10058400" cy="4754880"/>
+          </a:xfrm>
+        </p:spPr>
+        <p:txBody>
+          <a:bodyPr>
+            <a:normAutofit/>
+          </a:bodyPr>
+          <a:lstStyle/>
+          <a:p>
+            <a:r>
+              <a:rPr lang="en-US" sz="1800" dirty="0"/>
+              <a:t>Key components: schemas, tables, columns,  rows, cells, relationships</a:t>
+            </a:r>
+          </a:p>
+          <a:p>
+            <a:r>
+              <a:rPr lang="en-US" sz="1800" dirty="0"/>
+              <a:t>Designed to optimize sequential reads and writes.</a:t>
+            </a:r>
+          </a:p>
+          <a:p>
+            <a:r>
+              <a:rPr lang="en-US" sz="1800" dirty="0"/>
+              <a:t>Designed to facilatate random access by giving rows a fixed size in bytes.</a:t>
+            </a:r>
+          </a:p>
+          <a:p>
+            <a:r>
+              <a:rPr lang="en-US" sz="1800" dirty="0"/>
+              <a:t>Designed around the limitations of magnetic disk drives.</a:t>
+            </a:r>
+          </a:p>
+          <a:p>
+            <a:r>
+              <a:rPr lang="en-US" sz="1800" dirty="0"/>
+              <a:t>Designed to strictly enforce data types, relationships, and other constraints.</a:t>
+            </a:r>
+          </a:p>
+          <a:p>
+            <a:pPr marL="0" indent="0">
+              <a:buNone/>
+            </a:pPr>
+            <a:endParaRPr lang="en-US" sz="1800" dirty="0"/>
+          </a:p>
+          <a:p>
+            <a:pPr marL="0" indent="0">
+              <a:buNone/>
+            </a:pPr>
+            <a:r>
+              <a:rPr lang="en-US" sz="1800" b="1" dirty="0"/>
+              <a:t>Sources</a:t>
+            </a:r>
+          </a:p>
+          <a:p>
+            <a:pPr marL="0" indent="0">
+              <a:buNone/>
+            </a:pPr>
+            <a:r>
+              <a:rPr lang="en-US" sz="1800" dirty="0">
+                <a:hlinkClick r:id="rId2"/>
+              </a:rPr>
+              <a:t>https://www.mongodb.com/nosql-explained</a:t>
+            </a:r>
+            <a:endParaRPr lang="en-US" sz="1800" dirty="0">
+              <a:hlinkClick r:id="rId3"/>
+            </a:endParaRPr>
+          </a:p>
+          <a:p>
+            <a:pPr marL="0" indent="0">
+              <a:buNone/>
+            </a:pPr>
+            <a:r>
+              <a:rPr lang="en-US" sz="1800" dirty="0">
+                <a:hlinkClick r:id="rId3"/>
+              </a:rPr>
+              <a:t>https://en.wikipedia.org/wiki/relational_database</a:t>
+            </a:r>
+            <a:endParaRPr lang="en-US" sz="1800" dirty="0"/>
+          </a:p>
+          <a:p>
+            <a:pPr marL="0" indent="0">
+              <a:buNone/>
+            </a:pPr>
+            <a:r>
+              <a:rPr lang="en-US" sz="1800" dirty="0">
+                <a:hlinkClick r:id="rId4"/>
+              </a:rPr>
+              <a:t>https://en.wikipedia.org/wiki/sql</a:t>
+            </a:r>
+            <a:endParaRPr lang="en-US" sz="1800" dirty="0"/>
+          </a:p>
+        </p:txBody>
+      </p:sp>
+    </p:spTree>
+    <p:extLst>
+      <p:ext uri="{BB962C8B-B14F-4D97-AF65-F5344CB8AC3E}">
+        <p14:creationId xmlns:p14="http://schemas.microsoft.com/office/powerpoint/2010/main" val="3550088433"/>
       </p:ext>
     </p:extLst>
   </p:cSld>
@@ -17328,24 +15209,6 @@
 </file>
 
 <file path=customXml/item1.xml><?xml version="1.0" encoding="utf-8"?>
-<p:properties xmlns:p="http://schemas.microsoft.com/office/2006/metadata/properties" xmlns:xsi="http://www.w3.org/2001/XMLSchema-instance" xmlns:pc="http://schemas.microsoft.com/office/infopath/2007/PartnerControls">
-  <documentManagement>
-    <Status xmlns="71af3243-3dd4-4a8d-8c0d-dd76da1f02a5">Not started</Status>
-    <MediaServiceKeyPoints xmlns="71af3243-3dd4-4a8d-8c0d-dd76da1f02a5" xsi:nil="true"/>
-  </documentManagement>
-</p:properties>
-</file>
-
-<file path=customXml/item2.xml><?xml version="1.0" encoding="utf-8"?>
-<?mso-contentType ?>
-<FormTemplates xmlns="http://schemas.microsoft.com/sharepoint/v3/contenttype/forms">
-  <Display>DocumentLibraryForm</Display>
-  <Edit>DocumentLibraryForm</Edit>
-  <New>DocumentLibraryForm</New>
-</FormTemplates>
-</file>
-
-<file path=customXml/item3.xml><?xml version="1.0" encoding="utf-8"?>
 <ct:contentTypeSchema xmlns:ct="http://schemas.microsoft.com/office/2006/metadata/contentType" xmlns:ma="http://schemas.microsoft.com/office/2006/metadata/properties/metaAttributes" ct:_="" ma:_="" ma:contentTypeName="Document" ma:contentTypeID="0x01010079F111ED35F8CC479449609E8A0923A6" ma:contentTypeVersion="12" ma:contentTypeDescription="Create a new document." ma:contentTypeScope="" ma:versionID="a410dd7f93c95333ffa1b60ed6adedd1">
   <xsd:schema xmlns:xsd="http://www.w3.org/2001/XMLSchema" xmlns:xs="http://www.w3.org/2001/XMLSchema" xmlns:p="http://schemas.microsoft.com/office/2006/metadata/properties" xmlns:ns2="71af3243-3dd4-4a8d-8c0d-dd76da1f02a5" xmlns:ns3="16c05727-aa75-4e4a-9b5f-8a80a1165891" targetNamespace="http://schemas.microsoft.com/office/2006/metadata/properties" ma:root="true" ma:fieldsID="a936d9baba76aa3866493feff160faab" ns2:_="" ns3:_="">
     <xsd:import namespace="71af3243-3dd4-4a8d-8c0d-dd76da1f02a5"/>
@@ -17566,25 +15429,25 @@
 </ct:contentTypeSchema>
 </file>
 
-<file path=customXml/itemProps1.xml><?xml version="1.0" encoding="utf-8"?>
-<ds:datastoreItem xmlns:ds="http://schemas.openxmlformats.org/officeDocument/2006/customXml" ds:itemID="{E7228C0C-F774-4270-99CB-314B07EBFBE7}">
-  <ds:schemaRefs>
-    <ds:schemaRef ds:uri="http://schemas.microsoft.com/office/2006/metadata/properties"/>
-    <ds:schemaRef ds:uri="http://schemas.microsoft.com/office/infopath/2007/PartnerControls"/>
-    <ds:schemaRef ds:uri="71af3243-3dd4-4a8d-8c0d-dd76da1f02a5"/>
-  </ds:schemaRefs>
-</ds:datastoreItem>
+<file path=customXml/item2.xml><?xml version="1.0" encoding="utf-8"?>
+<?mso-contentType ?>
+<FormTemplates xmlns="http://schemas.microsoft.com/sharepoint/v3/contenttype/forms">
+  <Display>DocumentLibraryForm</Display>
+  <Edit>DocumentLibraryForm</Edit>
+  <New>DocumentLibraryForm</New>
+</FormTemplates>
 </file>
 
-<file path=customXml/itemProps2.xml><?xml version="1.0" encoding="utf-8"?>
-<ds:datastoreItem xmlns:ds="http://schemas.openxmlformats.org/officeDocument/2006/customXml" ds:itemID="{7745B92C-4D89-4324-B52D-E1F5F627B790}">
-  <ds:schemaRefs>
-    <ds:schemaRef ds:uri="http://schemas.microsoft.com/sharepoint/v3/contenttype/forms"/>
-  </ds:schemaRefs>
-</ds:datastoreItem>
+<file path=customXml/item3.xml><?xml version="1.0" encoding="utf-8"?>
+<p:properties xmlns:p="http://schemas.microsoft.com/office/2006/metadata/properties" xmlns:xsi="http://www.w3.org/2001/XMLSchema-instance" xmlns:pc="http://schemas.microsoft.com/office/infopath/2007/PartnerControls">
+  <documentManagement>
+    <Status xmlns="71af3243-3dd4-4a8d-8c0d-dd76da1f02a5">Not started</Status>
+    <MediaServiceKeyPoints xmlns="71af3243-3dd4-4a8d-8c0d-dd76da1f02a5" xsi:nil="true"/>
+  </documentManagement>
+</p:properties>
 </file>
 
-<file path=customXml/itemProps3.xml><?xml version="1.0" encoding="utf-8"?>
+<file path=customXml/itemProps1.xml><?xml version="1.0" encoding="utf-8"?>
 <ds:datastoreItem xmlns:ds="http://schemas.openxmlformats.org/officeDocument/2006/customXml" ds:itemID="{E4487CEA-7875-4327-875F-CA3B32E8009E}">
   <ds:schemaRefs>
     <ds:schemaRef ds:uri="http://schemas.microsoft.com/office/2006/metadata/contentType"/>
@@ -17601,4 +15464,22 @@
     <ds:schemaRef ds:uri="http://schemas.microsoft.com/internal/obd"/>
   </ds:schemaRefs>
 </ds:datastoreItem>
+</file>
+
+<file path=customXml/itemProps2.xml><?xml version="1.0" encoding="utf-8"?>
+<ds:datastoreItem xmlns:ds="http://schemas.openxmlformats.org/officeDocument/2006/customXml" ds:itemID="{7745B92C-4D89-4324-B52D-E1F5F627B790}">
+  <ds:schemaRefs>
+    <ds:schemaRef ds:uri="http://schemas.microsoft.com/sharepoint/v3/contenttype/forms"/>
+  </ds:schemaRefs>
+</ds:datastoreItem>
+</file>
+
+<file path=customXml/itemProps3.xml><?xml version="1.0" encoding="utf-8"?>
+<ds:datastoreItem xmlns:ds="http://schemas.openxmlformats.org/officeDocument/2006/customXml" ds:itemID="{E7228C0C-F774-4270-99CB-314B07EBFBE7}">
+  <ds:schemaRefs>
+    <ds:schemaRef ds:uri="http://schemas.microsoft.com/office/2006/metadata/properties"/>
+    <ds:schemaRef ds:uri="http://schemas.microsoft.com/office/infopath/2007/PartnerControls"/>
+    <ds:schemaRef ds:uri="71af3243-3dd4-4a8d-8c0d-dd76da1f02a5"/>
+  </ds:schemaRefs>
+</ds:datastoreItem>
 </file>
</xml_diff>